<commit_message>
Fix presentation generation - slides now have actual content
- Fix react-is version mismatch (v19 -> v18.3.1 to match React 18)
- Add resolveElement() to evaluate functional components before normalization
- Fix color parsing in normalizeShadow/normalizeGlow (add # prefix)
- Export flattenChildren utility

Presentations now correctly contain:
- 5 slides each with AVEMO branding
- Shapes with orange (#FF7932) accents
- Dark backgrounds (#0D0D0D)
- Proper text styling and layout
</commit_message>
<xml_diff>
--- a/output/design-1-cinematic-dark.pptx
+++ b/output/design-1-cinematic-dark.pptx
@@ -4,9 +4,15 @@
   <p:sldMasterIdLst>
     <p:sldMasterId id="2147483648" r:id="rId1"/>
   </p:sldMasterIdLst>
-  <p:sldIdLst/>
+  <p:sldIdLst>
+    <p:sldId id="256" r:id="rId2"/>
+    <p:sldId id="257" r:id="rId3"/>
+    <p:sldId id="258" r:id="rId4"/>
+    <p:sldId id="259" r:id="rId5"/>
+    <p:sldId id="260" r:id="rId6"/>
+  </p:sldIdLst>
   <p:notesMasterIdLst>
-    <p:notesMasterId r:id="rId2"/>
+    <p:notesMasterId r:id="rId7"/>
   </p:notesMasterIdLst>
   <p:sldSz cx="9144000" cy="5143500"/>
   <p:notesSz cx="5143500" cy="9144000"/>
@@ -452,6 +458,446 @@
     </a:lvl9pPr>
   </p:notesStyle>
 </p:notesMaster>
+</file>
+
+<file path=ppt/notesSlides/notesSlide1.xml><?xml version="1.0" encoding="utf-8"?>
+<p:notes xmlns:a="http://schemas.openxmlformats.org/drawingml/2006/main" xmlns:r="http://schemas.openxmlformats.org/officeDocument/2006/relationships" xmlns:p="http://schemas.openxmlformats.org/presentationml/2006/main">
+  <p:cSld>
+    <p:spTree>
+      <p:nvGrpSpPr>
+        <p:cNvPr id="1" name=""/>
+        <p:cNvGrpSpPr/>
+        <p:nvPr/>
+      </p:nvGrpSpPr>
+      <p:grpSpPr>
+        <a:xfrm>
+          <a:off x="0" y="0"/>
+          <a:ext cx="0" cy="0"/>
+          <a:chOff x="0" y="0"/>
+          <a:chExt cx="0" cy="0"/>
+        </a:xfrm>
+      </p:grpSpPr>
+      <p:sp>
+        <p:nvSpPr>
+          <p:cNvPr id="2" name="Slide Image Placeholder 1"/>
+          <p:cNvSpPr>
+            <a:spLocks noGrp="1" noRot="1" noChangeAspect="1"/>
+          </p:cNvSpPr>
+          <p:nvPr>
+            <p:ph type="sldImg"/>
+          </p:nvPr>
+        </p:nvSpPr>
+        <p:spPr/>
+      </p:sp>
+      <p:sp>
+        <p:nvSpPr>
+          <p:cNvPr id="3" name="Notes Placeholder 2"/>
+          <p:cNvSpPr>
+            <a:spLocks noGrp="1"/>
+          </p:cNvSpPr>
+          <p:nvPr>
+            <p:ph type="body" idx="1"/>
+          </p:nvPr>
+        </p:nvSpPr>
+        <p:spPr/>
+        <p:txBody>
+          <a:bodyPr/>
+          <a:lstStyle/>
+          <a:p>
+            <a:r>
+              <a:rPr lang="en-US" dirty="0"/>
+              <a:t/>
+            </a:r>
+            <a:endParaRPr lang="en-US" dirty="0"/>
+          </a:p>
+        </p:txBody>
+      </p:sp>
+      <p:sp>
+        <p:nvSpPr>
+          <p:cNvPr id="4" name="Slide Number Placeholder 3"/>
+          <p:cNvSpPr>
+            <a:spLocks noGrp="1"/>
+          </p:cNvSpPr>
+          <p:nvPr>
+            <p:ph type="sldNum" sz="quarter" idx="10"/>
+          </p:nvPr>
+        </p:nvSpPr>
+        <p:spPr/>
+        <p:txBody>
+          <a:bodyPr/>
+          <a:lstStyle/>
+          <a:p>
+            <a:fld id="{F7021451-1387-4CA6-816F-3879F97B5CBC}" type="slidenum">
+              <a:rPr lang="en-US"/>
+              <a:t>1</a:t>
+            </a:fld>
+            <a:endParaRPr lang="en-US"/>
+          </a:p>
+        </p:txBody>
+      </p:sp>
+    </p:spTree>
+    <p:extLst>
+      <p:ext uri="{BB962C8B-B14F-4D97-AF65-F5344CB8AC3E}">
+        <p14:creationId xmlns:p14="http://schemas.microsoft.com/office/powerpoint/2010/main" val="1024086991"/>
+      </p:ext>
+    </p:extLst>
+  </p:cSld>
+  <p:clrMapOvr>
+    <a:masterClrMapping/>
+  </p:clrMapOvr>
+</p:notes>
+</file>
+
+<file path=ppt/notesSlides/notesSlide2.xml><?xml version="1.0" encoding="utf-8"?>
+<p:notes xmlns:a="http://schemas.openxmlformats.org/drawingml/2006/main" xmlns:r="http://schemas.openxmlformats.org/officeDocument/2006/relationships" xmlns:p="http://schemas.openxmlformats.org/presentationml/2006/main">
+  <p:cSld>
+    <p:spTree>
+      <p:nvGrpSpPr>
+        <p:cNvPr id="1" name=""/>
+        <p:cNvGrpSpPr/>
+        <p:nvPr/>
+      </p:nvGrpSpPr>
+      <p:grpSpPr>
+        <a:xfrm>
+          <a:off x="0" y="0"/>
+          <a:ext cx="0" cy="0"/>
+          <a:chOff x="0" y="0"/>
+          <a:chExt cx="0" cy="0"/>
+        </a:xfrm>
+      </p:grpSpPr>
+      <p:sp>
+        <p:nvSpPr>
+          <p:cNvPr id="2" name="Slide Image Placeholder 1"/>
+          <p:cNvSpPr>
+            <a:spLocks noGrp="1" noRot="1" noChangeAspect="1"/>
+          </p:cNvSpPr>
+          <p:nvPr>
+            <p:ph type="sldImg"/>
+          </p:nvPr>
+        </p:nvSpPr>
+        <p:spPr/>
+      </p:sp>
+      <p:sp>
+        <p:nvSpPr>
+          <p:cNvPr id="3" name="Notes Placeholder 2"/>
+          <p:cNvSpPr>
+            <a:spLocks noGrp="1"/>
+          </p:cNvSpPr>
+          <p:nvPr>
+            <p:ph type="body" idx="1"/>
+          </p:nvPr>
+        </p:nvSpPr>
+        <p:spPr/>
+        <p:txBody>
+          <a:bodyPr/>
+          <a:lstStyle/>
+          <a:p>
+            <a:r>
+              <a:rPr lang="en-US" dirty="0"/>
+              <a:t/>
+            </a:r>
+            <a:endParaRPr lang="en-US" dirty="0"/>
+          </a:p>
+        </p:txBody>
+      </p:sp>
+      <p:sp>
+        <p:nvSpPr>
+          <p:cNvPr id="4" name="Slide Number Placeholder 3"/>
+          <p:cNvSpPr>
+            <a:spLocks noGrp="1"/>
+          </p:cNvSpPr>
+          <p:nvPr>
+            <p:ph type="sldNum" sz="quarter" idx="10"/>
+          </p:nvPr>
+        </p:nvSpPr>
+        <p:spPr/>
+        <p:txBody>
+          <a:bodyPr/>
+          <a:lstStyle/>
+          <a:p>
+            <a:fld id="{F7021451-1387-4CA6-816F-3879F97B5CBC}" type="slidenum">
+              <a:rPr lang="en-US"/>
+              <a:t>2</a:t>
+            </a:fld>
+            <a:endParaRPr lang="en-US"/>
+          </a:p>
+        </p:txBody>
+      </p:sp>
+    </p:spTree>
+    <p:extLst>
+      <p:ext uri="{BB962C8B-B14F-4D97-AF65-F5344CB8AC3E}">
+        <p14:creationId xmlns:p14="http://schemas.microsoft.com/office/powerpoint/2010/main" val="1024086991"/>
+      </p:ext>
+    </p:extLst>
+  </p:cSld>
+  <p:clrMapOvr>
+    <a:masterClrMapping/>
+  </p:clrMapOvr>
+</p:notes>
+</file>
+
+<file path=ppt/notesSlides/notesSlide3.xml><?xml version="1.0" encoding="utf-8"?>
+<p:notes xmlns:a="http://schemas.openxmlformats.org/drawingml/2006/main" xmlns:r="http://schemas.openxmlformats.org/officeDocument/2006/relationships" xmlns:p="http://schemas.openxmlformats.org/presentationml/2006/main">
+  <p:cSld>
+    <p:spTree>
+      <p:nvGrpSpPr>
+        <p:cNvPr id="1" name=""/>
+        <p:cNvGrpSpPr/>
+        <p:nvPr/>
+      </p:nvGrpSpPr>
+      <p:grpSpPr>
+        <a:xfrm>
+          <a:off x="0" y="0"/>
+          <a:ext cx="0" cy="0"/>
+          <a:chOff x="0" y="0"/>
+          <a:chExt cx="0" cy="0"/>
+        </a:xfrm>
+      </p:grpSpPr>
+      <p:sp>
+        <p:nvSpPr>
+          <p:cNvPr id="2" name="Slide Image Placeholder 1"/>
+          <p:cNvSpPr>
+            <a:spLocks noGrp="1" noRot="1" noChangeAspect="1"/>
+          </p:cNvSpPr>
+          <p:nvPr>
+            <p:ph type="sldImg"/>
+          </p:nvPr>
+        </p:nvSpPr>
+        <p:spPr/>
+      </p:sp>
+      <p:sp>
+        <p:nvSpPr>
+          <p:cNvPr id="3" name="Notes Placeholder 2"/>
+          <p:cNvSpPr>
+            <a:spLocks noGrp="1"/>
+          </p:cNvSpPr>
+          <p:nvPr>
+            <p:ph type="body" idx="1"/>
+          </p:nvPr>
+        </p:nvSpPr>
+        <p:spPr/>
+        <p:txBody>
+          <a:bodyPr/>
+          <a:lstStyle/>
+          <a:p>
+            <a:r>
+              <a:rPr lang="en-US" dirty="0"/>
+              <a:t/>
+            </a:r>
+            <a:endParaRPr lang="en-US" dirty="0"/>
+          </a:p>
+        </p:txBody>
+      </p:sp>
+      <p:sp>
+        <p:nvSpPr>
+          <p:cNvPr id="4" name="Slide Number Placeholder 3"/>
+          <p:cNvSpPr>
+            <a:spLocks noGrp="1"/>
+          </p:cNvSpPr>
+          <p:nvPr>
+            <p:ph type="sldNum" sz="quarter" idx="10"/>
+          </p:nvPr>
+        </p:nvSpPr>
+        <p:spPr/>
+        <p:txBody>
+          <a:bodyPr/>
+          <a:lstStyle/>
+          <a:p>
+            <a:fld id="{F7021451-1387-4CA6-816F-3879F97B5CBC}" type="slidenum">
+              <a:rPr lang="en-US"/>
+              <a:t>3</a:t>
+            </a:fld>
+            <a:endParaRPr lang="en-US"/>
+          </a:p>
+        </p:txBody>
+      </p:sp>
+    </p:spTree>
+    <p:extLst>
+      <p:ext uri="{BB962C8B-B14F-4D97-AF65-F5344CB8AC3E}">
+        <p14:creationId xmlns:p14="http://schemas.microsoft.com/office/powerpoint/2010/main" val="1024086991"/>
+      </p:ext>
+    </p:extLst>
+  </p:cSld>
+  <p:clrMapOvr>
+    <a:masterClrMapping/>
+  </p:clrMapOvr>
+</p:notes>
+</file>
+
+<file path=ppt/notesSlides/notesSlide4.xml><?xml version="1.0" encoding="utf-8"?>
+<p:notes xmlns:a="http://schemas.openxmlformats.org/drawingml/2006/main" xmlns:r="http://schemas.openxmlformats.org/officeDocument/2006/relationships" xmlns:p="http://schemas.openxmlformats.org/presentationml/2006/main">
+  <p:cSld>
+    <p:spTree>
+      <p:nvGrpSpPr>
+        <p:cNvPr id="1" name=""/>
+        <p:cNvGrpSpPr/>
+        <p:nvPr/>
+      </p:nvGrpSpPr>
+      <p:grpSpPr>
+        <a:xfrm>
+          <a:off x="0" y="0"/>
+          <a:ext cx="0" cy="0"/>
+          <a:chOff x="0" y="0"/>
+          <a:chExt cx="0" cy="0"/>
+        </a:xfrm>
+      </p:grpSpPr>
+      <p:sp>
+        <p:nvSpPr>
+          <p:cNvPr id="2" name="Slide Image Placeholder 1"/>
+          <p:cNvSpPr>
+            <a:spLocks noGrp="1" noRot="1" noChangeAspect="1"/>
+          </p:cNvSpPr>
+          <p:nvPr>
+            <p:ph type="sldImg"/>
+          </p:nvPr>
+        </p:nvSpPr>
+        <p:spPr/>
+      </p:sp>
+      <p:sp>
+        <p:nvSpPr>
+          <p:cNvPr id="3" name="Notes Placeholder 2"/>
+          <p:cNvSpPr>
+            <a:spLocks noGrp="1"/>
+          </p:cNvSpPr>
+          <p:nvPr>
+            <p:ph type="body" idx="1"/>
+          </p:nvPr>
+        </p:nvSpPr>
+        <p:spPr/>
+        <p:txBody>
+          <a:bodyPr/>
+          <a:lstStyle/>
+          <a:p>
+            <a:r>
+              <a:rPr lang="en-US" dirty="0"/>
+              <a:t/>
+            </a:r>
+            <a:endParaRPr lang="en-US" dirty="0"/>
+          </a:p>
+        </p:txBody>
+      </p:sp>
+      <p:sp>
+        <p:nvSpPr>
+          <p:cNvPr id="4" name="Slide Number Placeholder 3"/>
+          <p:cNvSpPr>
+            <a:spLocks noGrp="1"/>
+          </p:cNvSpPr>
+          <p:nvPr>
+            <p:ph type="sldNum" sz="quarter" idx="10"/>
+          </p:nvPr>
+        </p:nvSpPr>
+        <p:spPr/>
+        <p:txBody>
+          <a:bodyPr/>
+          <a:lstStyle/>
+          <a:p>
+            <a:fld id="{F7021451-1387-4CA6-816F-3879F97B5CBC}" type="slidenum">
+              <a:rPr lang="en-US"/>
+              <a:t>4</a:t>
+            </a:fld>
+            <a:endParaRPr lang="en-US"/>
+          </a:p>
+        </p:txBody>
+      </p:sp>
+    </p:spTree>
+    <p:extLst>
+      <p:ext uri="{BB962C8B-B14F-4D97-AF65-F5344CB8AC3E}">
+        <p14:creationId xmlns:p14="http://schemas.microsoft.com/office/powerpoint/2010/main" val="1024086991"/>
+      </p:ext>
+    </p:extLst>
+  </p:cSld>
+  <p:clrMapOvr>
+    <a:masterClrMapping/>
+  </p:clrMapOvr>
+</p:notes>
+</file>
+
+<file path=ppt/notesSlides/notesSlide5.xml><?xml version="1.0" encoding="utf-8"?>
+<p:notes xmlns:a="http://schemas.openxmlformats.org/drawingml/2006/main" xmlns:r="http://schemas.openxmlformats.org/officeDocument/2006/relationships" xmlns:p="http://schemas.openxmlformats.org/presentationml/2006/main">
+  <p:cSld>
+    <p:spTree>
+      <p:nvGrpSpPr>
+        <p:cNvPr id="1" name=""/>
+        <p:cNvGrpSpPr/>
+        <p:nvPr/>
+      </p:nvGrpSpPr>
+      <p:grpSpPr>
+        <a:xfrm>
+          <a:off x="0" y="0"/>
+          <a:ext cx="0" cy="0"/>
+          <a:chOff x="0" y="0"/>
+          <a:chExt cx="0" cy="0"/>
+        </a:xfrm>
+      </p:grpSpPr>
+      <p:sp>
+        <p:nvSpPr>
+          <p:cNvPr id="2" name="Slide Image Placeholder 1"/>
+          <p:cNvSpPr>
+            <a:spLocks noGrp="1" noRot="1" noChangeAspect="1"/>
+          </p:cNvSpPr>
+          <p:nvPr>
+            <p:ph type="sldImg"/>
+          </p:nvPr>
+        </p:nvSpPr>
+        <p:spPr/>
+      </p:sp>
+      <p:sp>
+        <p:nvSpPr>
+          <p:cNvPr id="3" name="Notes Placeholder 2"/>
+          <p:cNvSpPr>
+            <a:spLocks noGrp="1"/>
+          </p:cNvSpPr>
+          <p:nvPr>
+            <p:ph type="body" idx="1"/>
+          </p:nvPr>
+        </p:nvSpPr>
+        <p:spPr/>
+        <p:txBody>
+          <a:bodyPr/>
+          <a:lstStyle/>
+          <a:p>
+            <a:r>
+              <a:rPr lang="en-US" dirty="0"/>
+              <a:t/>
+            </a:r>
+            <a:endParaRPr lang="en-US" dirty="0"/>
+          </a:p>
+        </p:txBody>
+      </p:sp>
+      <p:sp>
+        <p:nvSpPr>
+          <p:cNvPr id="4" name="Slide Number Placeholder 3"/>
+          <p:cNvSpPr>
+            <a:spLocks noGrp="1"/>
+          </p:cNvSpPr>
+          <p:nvPr>
+            <p:ph type="sldNum" sz="quarter" idx="10"/>
+          </p:nvPr>
+        </p:nvSpPr>
+        <p:spPr/>
+        <p:txBody>
+          <a:bodyPr/>
+          <a:lstStyle/>
+          <a:p>
+            <a:fld id="{F7021451-1387-4CA6-816F-3879F97B5CBC}" type="slidenum">
+              <a:rPr lang="en-US"/>
+              <a:t>5</a:t>
+            </a:fld>
+            <a:endParaRPr lang="en-US"/>
+          </a:p>
+        </p:txBody>
+      </p:sp>
+    </p:spTree>
+    <p:extLst>
+      <p:ext uri="{BB962C8B-B14F-4D97-AF65-F5344CB8AC3E}">
+        <p14:creationId xmlns:p14="http://schemas.microsoft.com/office/powerpoint/2010/main" val="1024086991"/>
+      </p:ext>
+    </p:extLst>
+  </p:cSld>
+  <p:clrMapOvr>
+    <a:masterClrMapping/>
+  </p:clrMapOvr>
+</p:notes>
 </file>
 
 <file path=ppt/slideLayouts/slideLayout1.xml><?xml version="1.0" encoding="utf-8"?>
@@ -761,6 +1207,2711 @@
 </p:sldMaster>
 </file>
 
+<file path=ppt/slides/slide1.xml><?xml version="1.0" encoding="utf-8"?>
+<p:sld xmlns:a="http://schemas.openxmlformats.org/drawingml/2006/main" xmlns:r="http://schemas.openxmlformats.org/officeDocument/2006/relationships" xmlns:p="http://schemas.openxmlformats.org/presentationml/2006/main">
+  <p:cSld name="Slide 1">
+    <p:bg>
+      <p:bgPr>
+        <a:solidFill>
+          <a:srgbClr val="0D0D0D"/>
+        </a:solidFill>
+      </p:bgPr>
+    </p:bg>
+    <p:spTree>
+      <p:nvGrpSpPr>
+        <p:cNvPr id="1" name=""/>
+        <p:cNvGrpSpPr/>
+        <p:nvPr/>
+      </p:nvGrpSpPr>
+      <p:grpSpPr>
+        <a:xfrm>
+          <a:off x="0" y="0"/>
+          <a:ext cx="0" cy="0"/>
+          <a:chOff x="0" y="0"/>
+          <a:chExt cx="0" cy="0"/>
+        </a:xfrm>
+      </p:grpSpPr>
+      <p:sp>
+        <p:nvSpPr>
+          <p:cNvPr id="2" name="Shape 0"/>
+          <p:cNvSpPr/>
+          <p:nvPr/>
+        </p:nvSpPr>
+        <p:spPr>
+          <a:xfrm>
+            <a:off x="6400800" y="-914400"/>
+            <a:ext cx="7315200" cy="7315200"/>
+          </a:xfrm>
+          <a:prstGeom prst="ellipse">
+            <a:avLst/>
+          </a:prstGeom>
+          <a:solidFill>
+            <a:srgbClr val="FF7932">
+              <a:alpha val="15000"/>
+            </a:srgbClr>
+          </a:solidFill>
+          <a:ln w="12700">
+            <a:solidFill>
+              <a:srgbClr val="333333"/>
+            </a:solidFill>
+            <a:prstDash val="solid"/>
+          </a:ln>
+        </p:spPr>
+      </p:sp>
+      <p:sp>
+        <p:nvSpPr>
+          <p:cNvPr id="3" name="Shape 1"/>
+          <p:cNvSpPr/>
+          <p:nvPr/>
+        </p:nvSpPr>
+        <p:spPr>
+          <a:xfrm>
+            <a:off x="0" y="0"/>
+            <a:ext cx="9144000" cy="109728"/>
+          </a:xfrm>
+          <a:prstGeom prst="rect">
+            <a:avLst/>
+          </a:prstGeom>
+          <a:solidFill>
+            <a:srgbClr val="FF7932"/>
+          </a:solidFill>
+          <a:ln w="12700">
+            <a:solidFill>
+              <a:srgbClr val="333333"/>
+            </a:solidFill>
+            <a:prstDash val="solid"/>
+          </a:ln>
+        </p:spPr>
+      </p:sp>
+      <p:sp>
+        <p:nvSpPr>
+          <p:cNvPr id="4" name="Text 2"/>
+          <p:cNvSpPr/>
+          <p:nvPr/>
+        </p:nvSpPr>
+        <p:spPr>
+          <a:xfrm>
+            <a:off x="731520" y="2011680"/>
+            <a:ext cx="9144000" cy="1371600"/>
+          </a:xfrm>
+          <a:prstGeom prst="rect">
+            <a:avLst/>
+          </a:prstGeom>
+          <a:noFill/>
+          <a:ln/>
+        </p:spPr>
+        <p:txBody>
+          <a:bodyPr wrap="square" rtlCol="0" anchor="ctr"/>
+          <a:lstStyle/>
+          <a:p>
+            <a:pPr indent="0" marL="0">
+              <a:buNone/>
+            </a:pPr>
+            <a:r>
+              <a:rPr lang="en-US" sz="9600" b="1" dirty="0">
+                <a:solidFill>
+                  <a:srgbClr val="FFFFFF"/>
+                </a:solidFill>
+                <a:latin typeface="Arial Black" pitchFamily="34" charset="0"/>
+                <a:ea typeface="Arial Black" pitchFamily="34" charset="-122"/>
+                <a:cs typeface="Arial Black" pitchFamily="34" charset="-120"/>
+              </a:rPr>
+              <a:t>Fahrersoftware</a:t>
+            </a:r>
+            <a:endParaRPr lang="en-US" sz="9600" dirty="0"/>
+          </a:p>
+        </p:txBody>
+      </p:sp>
+      <p:sp>
+        <p:nvSpPr>
+          <p:cNvPr id="5" name="Text 3"/>
+          <p:cNvSpPr/>
+          <p:nvPr/>
+        </p:nvSpPr>
+        <p:spPr>
+          <a:xfrm>
+            <a:off x="731520" y="3474720"/>
+            <a:ext cx="7315200" cy="731520"/>
+          </a:xfrm>
+          <a:prstGeom prst="rect">
+            <a:avLst/>
+          </a:prstGeom>
+          <a:noFill/>
+          <a:ln/>
+        </p:spPr>
+        <p:txBody>
+          <a:bodyPr wrap="square" rtlCol="0" anchor="ctr"/>
+          <a:lstStyle/>
+          <a:p>
+            <a:pPr indent="0" marL="0">
+              <a:buNone/>
+            </a:pPr>
+            <a:r>
+              <a:rPr lang="en-US" sz="2400" b="1" dirty="0">
+                <a:solidFill>
+                  <a:srgbClr val="FF7932"/>
+                </a:solidFill>
+                <a:latin typeface="Arial" pitchFamily="34" charset="0"/>
+                <a:ea typeface="Arial" pitchFamily="34" charset="-122"/>
+                <a:cs typeface="Arial" pitchFamily="34" charset="-120"/>
+              </a:rPr>
+              <a:t>Die Zukunft der Fahrzeugdisposition</a:t>
+            </a:r>
+            <a:endParaRPr lang="en-US" sz="2400" dirty="0"/>
+          </a:p>
+        </p:txBody>
+      </p:sp>
+      <p:sp>
+        <p:nvSpPr>
+          <p:cNvPr id="6" name="Shape 4"/>
+          <p:cNvSpPr/>
+          <p:nvPr/>
+        </p:nvSpPr>
+        <p:spPr>
+          <a:xfrm>
+            <a:off x="731520" y="4389120"/>
+            <a:ext cx="6400800" cy="1097280"/>
+          </a:xfrm>
+          <a:prstGeom prst="roundRect">
+            <a:avLst>
+              <a:gd name="adj" fmla="val 12500"/>
+            </a:avLst>
+          </a:prstGeom>
+          <a:solidFill>
+            <a:srgbClr val="1A1A1A">
+              <a:alpha val="70000"/>
+            </a:srgbClr>
+          </a:solidFill>
+          <a:ln w="12700">
+            <a:solidFill>
+              <a:srgbClr val="FF7932"/>
+            </a:solidFill>
+            <a:prstDash val="solid"/>
+          </a:ln>
+          <a:effectLst>
+            <a:outerShdw sx="100000" sy="100000" kx="0" ky="0" algn="bl" rotWithShape="0" blurRad="304800" dist="101600" dir="8100000">
+              <a:srgbClr val="000000">
+                <a:alpha val="25000"/>
+              </a:srgbClr>
+            </a:outerShdw>
+          </a:effectLst>
+        </p:spPr>
+      </p:sp>
+      <p:sp>
+        <p:nvSpPr>
+          <p:cNvPr id="7" name="Text 5"/>
+          <p:cNvSpPr/>
+          <p:nvPr/>
+        </p:nvSpPr>
+        <p:spPr>
+          <a:xfrm>
+            <a:off x="914400" y="4663440"/>
+            <a:ext cx="6035040" cy="640080"/>
+          </a:xfrm>
+          <a:prstGeom prst="rect">
+            <a:avLst/>
+          </a:prstGeom>
+          <a:noFill/>
+          <a:ln/>
+        </p:spPr>
+        <p:txBody>
+          <a:bodyPr wrap="square" rtlCol="0" anchor="ctr"/>
+          <a:lstStyle/>
+          <a:p>
+            <a:pPr indent="0" marL="0">
+              <a:lnSpc>
+                <a:spcPts val="2800"/>
+              </a:lnSpc>
+              <a:buNone/>
+            </a:pPr>
+            <a:r>
+              <a:rPr lang="en-US" sz="2000" dirty="0">
+                <a:solidFill>
+                  <a:srgbClr val="FFFFFF"/>
+                </a:solidFill>
+                <a:latin typeface="Arial" pitchFamily="34" charset="0"/>
+                <a:ea typeface="Arial" pitchFamily="34" charset="-122"/>
+                <a:cs typeface="Arial" pitchFamily="34" charset="-120"/>
+              </a:rPr>
+              <a:t>Eine Software für alle Standorte</a:t>
+            </a:r>
+            <a:endParaRPr lang="en-US" sz="2000" dirty="0"/>
+          </a:p>
+        </p:txBody>
+      </p:sp>
+    </p:spTree>
+  </p:cSld>
+  <p:clrMapOvr>
+    <a:masterClrMapping/>
+  </p:clrMapOvr>
+</p:sld>
+</file>
+
+<file path=ppt/slides/slide2.xml><?xml version="1.0" encoding="utf-8"?>
+<p:sld xmlns:a="http://schemas.openxmlformats.org/drawingml/2006/main" xmlns:r="http://schemas.openxmlformats.org/officeDocument/2006/relationships" xmlns:p="http://schemas.openxmlformats.org/presentationml/2006/main">
+  <p:cSld name="Slide 2">
+    <p:bg>
+      <p:bgPr>
+        <a:solidFill>
+          <a:srgbClr val="0D0D0D"/>
+        </a:solidFill>
+      </p:bgPr>
+    </p:bg>
+    <p:spTree>
+      <p:nvGrpSpPr>
+        <p:cNvPr id="1" name=""/>
+        <p:cNvGrpSpPr/>
+        <p:nvPr/>
+      </p:nvGrpSpPr>
+      <p:grpSpPr>
+        <a:xfrm>
+          <a:off x="0" y="0"/>
+          <a:ext cx="0" cy="0"/>
+          <a:chOff x="0" y="0"/>
+          <a:chExt cx="0" cy="0"/>
+        </a:xfrm>
+      </p:grpSpPr>
+      <p:sp>
+        <p:nvSpPr>
+          <p:cNvPr id="2" name="Shape 0"/>
+          <p:cNvSpPr/>
+          <p:nvPr/>
+        </p:nvSpPr>
+        <p:spPr>
+          <a:xfrm>
+            <a:off x="0" y="0"/>
+            <a:ext cx="4114800" cy="5143500"/>
+          </a:xfrm>
+          <a:prstGeom prst="rect">
+            <a:avLst/>
+          </a:prstGeom>
+          <a:solidFill>
+            <a:srgbClr val="141414"/>
+          </a:solidFill>
+          <a:ln w="12700">
+            <a:solidFill>
+              <a:srgbClr val="333333"/>
+            </a:solidFill>
+            <a:prstDash val="solid"/>
+          </a:ln>
+        </p:spPr>
+      </p:sp>
+      <p:sp>
+        <p:nvSpPr>
+          <p:cNvPr id="3" name="Text 1"/>
+          <p:cNvSpPr/>
+          <p:nvPr/>
+        </p:nvSpPr>
+        <p:spPr>
+          <a:xfrm>
+            <a:off x="457200" y="731520"/>
+            <a:ext cx="3200400" cy="457200"/>
+          </a:xfrm>
+          <a:prstGeom prst="rect">
+            <a:avLst/>
+          </a:prstGeom>
+          <a:noFill/>
+          <a:ln/>
+        </p:spPr>
+        <p:txBody>
+          <a:bodyPr wrap="square" rtlCol="0" anchor="ctr"/>
+          <a:lstStyle/>
+          <a:p>
+            <a:pPr indent="0" marL="0">
+              <a:buNone/>
+            </a:pPr>
+            <a:r>
+              <a:rPr lang="en-US" sz="1400" b="1" dirty="0">
+                <a:solidFill>
+                  <a:srgbClr val="FF7932"/>
+                </a:solidFill>
+                <a:latin typeface="Arial" pitchFamily="34" charset="0"/>
+                <a:ea typeface="Arial" pitchFamily="34" charset="-122"/>
+                <a:cs typeface="Arial" pitchFamily="34" charset="-120"/>
+              </a:rPr>
+              <a:t>DAS PROBLEM</a:t>
+            </a:r>
+            <a:endParaRPr lang="en-US" sz="1400" dirty="0"/>
+          </a:p>
+        </p:txBody>
+      </p:sp>
+      <p:sp>
+        <p:nvSpPr>
+          <p:cNvPr id="4" name="Text 2"/>
+          <p:cNvSpPr/>
+          <p:nvPr/>
+        </p:nvSpPr>
+        <p:spPr>
+          <a:xfrm>
+            <a:off x="457200" y="1280160"/>
+            <a:ext cx="3474720" cy="914400"/>
+          </a:xfrm>
+          <a:prstGeom prst="rect">
+            <a:avLst/>
+          </a:prstGeom>
+          <a:noFill/>
+          <a:ln/>
+        </p:spPr>
+        <p:txBody>
+          <a:bodyPr wrap="square" rtlCol="0" anchor="ctr"/>
+          <a:lstStyle/>
+          <a:p>
+            <a:pPr indent="0" marL="0">
+              <a:buNone/>
+            </a:pPr>
+            <a:r>
+              <a:rPr lang="en-US" sz="3200" b="1" dirty="0">
+                <a:solidFill>
+                  <a:srgbClr val="FFFFFF"/>
+                </a:solidFill>
+                <a:latin typeface="Arial" pitchFamily="34" charset="0"/>
+                <a:ea typeface="Arial" pitchFamily="34" charset="-122"/>
+                <a:cs typeface="Arial" pitchFamily="34" charset="-120"/>
+              </a:rPr>
+              <a:t>Aktuelle Herausforderungen</a:t>
+            </a:r>
+            <a:endParaRPr lang="en-US" sz="3200" dirty="0"/>
+          </a:p>
+        </p:txBody>
+      </p:sp>
+      <p:sp>
+        <p:nvSpPr>
+          <p:cNvPr id="5" name="Shape 3"/>
+          <p:cNvSpPr/>
+          <p:nvPr/>
+        </p:nvSpPr>
+        <p:spPr>
+          <a:xfrm>
+            <a:off x="457200" y="2560320"/>
+            <a:ext cx="3474720" cy="822960"/>
+          </a:xfrm>
+          <a:prstGeom prst="roundRect">
+            <a:avLst>
+              <a:gd name="adj" fmla="val 11111"/>
+            </a:avLst>
+          </a:prstGeom>
+          <a:solidFill>
+            <a:srgbClr val="222222">
+              <a:alpha val="80000"/>
+            </a:srgbClr>
+          </a:solidFill>
+          <a:ln w="12700">
+            <a:solidFill>
+              <a:srgbClr val="FF7932"/>
+            </a:solidFill>
+            <a:prstDash val="solid"/>
+          </a:ln>
+          <a:effectLst>
+            <a:outerShdw sx="100000" sy="100000" kx="0" ky="0" algn="bl" rotWithShape="0" blurRad="101600" dist="25400" dir="5400000">
+              <a:srgbClr val="000000">
+                <a:alpha val="10000"/>
+              </a:srgbClr>
+            </a:outerShdw>
+          </a:effectLst>
+        </p:spPr>
+      </p:sp>
+      <p:sp>
+        <p:nvSpPr>
+          <p:cNvPr id="6" name="Text 4"/>
+          <p:cNvSpPr/>
+          <p:nvPr/>
+        </p:nvSpPr>
+        <p:spPr>
+          <a:xfrm>
+            <a:off x="640080" y="2651760"/>
+            <a:ext cx="3108960" cy="320040"/>
+          </a:xfrm>
+          <a:prstGeom prst="rect">
+            <a:avLst/>
+          </a:prstGeom>
+          <a:noFill/>
+          <a:ln/>
+        </p:spPr>
+        <p:txBody>
+          <a:bodyPr wrap="square" rtlCol="0" anchor="ctr"/>
+          <a:lstStyle/>
+          <a:p>
+            <a:pPr indent="0" marL="0">
+              <a:buNone/>
+            </a:pPr>
+            <a:r>
+              <a:rPr lang="en-US" sz="1800" b="1" dirty="0">
+                <a:solidFill>
+                  <a:srgbClr val="FFFFFF"/>
+                </a:solidFill>
+                <a:latin typeface="Arial" pitchFamily="34" charset="0"/>
+                <a:ea typeface="Arial" pitchFamily="34" charset="-122"/>
+                <a:cs typeface="Arial" pitchFamily="34" charset="-120"/>
+              </a:rPr>
+              <a:t>Isolierte Standorte</a:t>
+            </a:r>
+            <a:endParaRPr lang="en-US" sz="1800" dirty="0"/>
+          </a:p>
+        </p:txBody>
+      </p:sp>
+      <p:sp>
+        <p:nvSpPr>
+          <p:cNvPr id="7" name="Text 5"/>
+          <p:cNvSpPr/>
+          <p:nvPr/>
+        </p:nvSpPr>
+        <p:spPr>
+          <a:xfrm>
+            <a:off x="640080" y="2971800"/>
+            <a:ext cx="3108960" cy="320040"/>
+          </a:xfrm>
+          <a:prstGeom prst="rect">
+            <a:avLst/>
+          </a:prstGeom>
+          <a:noFill/>
+          <a:ln/>
+        </p:spPr>
+        <p:txBody>
+          <a:bodyPr wrap="square" rtlCol="0" anchor="ctr"/>
+          <a:lstStyle/>
+          <a:p>
+            <a:pPr indent="0" marL="0">
+              <a:buNone/>
+            </a:pPr>
+            <a:r>
+              <a:rPr lang="en-US" sz="1100" dirty="0">
+                <a:solidFill>
+                  <a:srgbClr val="AAAAAA"/>
+                </a:solidFill>
+                <a:latin typeface="Arial" pitchFamily="34" charset="0"/>
+                <a:ea typeface="Arial" pitchFamily="34" charset="-122"/>
+                <a:cs typeface="Arial" pitchFamily="34" charset="-120"/>
+              </a:rPr>
+              <a:t>Keine Vernetzung zwischen den Niederlassungen</a:t>
+            </a:r>
+            <a:endParaRPr lang="en-US" sz="1100" dirty="0"/>
+          </a:p>
+        </p:txBody>
+      </p:sp>
+      <p:sp>
+        <p:nvSpPr>
+          <p:cNvPr id="8" name="Shape 6"/>
+          <p:cNvSpPr/>
+          <p:nvPr/>
+        </p:nvSpPr>
+        <p:spPr>
+          <a:xfrm>
+            <a:off x="457200" y="3520440"/>
+            <a:ext cx="3474720" cy="822960"/>
+          </a:xfrm>
+          <a:prstGeom prst="roundRect">
+            <a:avLst>
+              <a:gd name="adj" fmla="val 11111"/>
+            </a:avLst>
+          </a:prstGeom>
+          <a:solidFill>
+            <a:srgbClr val="222222">
+              <a:alpha val="80000"/>
+            </a:srgbClr>
+          </a:solidFill>
+          <a:ln w="12700">
+            <a:solidFill>
+              <a:srgbClr val="FF7932"/>
+            </a:solidFill>
+            <a:prstDash val="solid"/>
+          </a:ln>
+          <a:effectLst>
+            <a:outerShdw sx="100000" sy="100000" kx="0" ky="0" algn="bl" rotWithShape="0" blurRad="101600" dist="25400" dir="5400000">
+              <a:srgbClr val="000000">
+                <a:alpha val="10000"/>
+              </a:srgbClr>
+            </a:outerShdw>
+          </a:effectLst>
+        </p:spPr>
+      </p:sp>
+      <p:sp>
+        <p:nvSpPr>
+          <p:cNvPr id="9" name="Text 7"/>
+          <p:cNvSpPr/>
+          <p:nvPr/>
+        </p:nvSpPr>
+        <p:spPr>
+          <a:xfrm>
+            <a:off x="640080" y="3611880"/>
+            <a:ext cx="3108960" cy="320040"/>
+          </a:xfrm>
+          <a:prstGeom prst="rect">
+            <a:avLst/>
+          </a:prstGeom>
+          <a:noFill/>
+          <a:ln/>
+        </p:spPr>
+        <p:txBody>
+          <a:bodyPr wrap="square" rtlCol="0" anchor="ctr"/>
+          <a:lstStyle/>
+          <a:p>
+            <a:pPr indent="0" marL="0">
+              <a:buNone/>
+            </a:pPr>
+            <a:r>
+              <a:rPr lang="en-US" sz="1800" b="1" dirty="0">
+                <a:solidFill>
+                  <a:srgbClr val="FFFFFF"/>
+                </a:solidFill>
+                <a:latin typeface="Arial" pitchFamily="34" charset="0"/>
+                <a:ea typeface="Arial" pitchFamily="34" charset="-122"/>
+                <a:cs typeface="Arial" pitchFamily="34" charset="-120"/>
+              </a:rPr>
+              <a:t>Manuelle Prozesse</a:t>
+            </a:r>
+            <a:endParaRPr lang="en-US" sz="1800" dirty="0"/>
+          </a:p>
+        </p:txBody>
+      </p:sp>
+      <p:sp>
+        <p:nvSpPr>
+          <p:cNvPr id="10" name="Text 8"/>
+          <p:cNvSpPr/>
+          <p:nvPr/>
+        </p:nvSpPr>
+        <p:spPr>
+          <a:xfrm>
+            <a:off x="640080" y="3931920"/>
+            <a:ext cx="3108960" cy="320040"/>
+          </a:xfrm>
+          <a:prstGeom prst="rect">
+            <a:avLst/>
+          </a:prstGeom>
+          <a:noFill/>
+          <a:ln/>
+        </p:spPr>
+        <p:txBody>
+          <a:bodyPr wrap="square" rtlCol="0" anchor="ctr"/>
+          <a:lstStyle/>
+          <a:p>
+            <a:pPr indent="0" marL="0">
+              <a:buNone/>
+            </a:pPr>
+            <a:r>
+              <a:rPr lang="en-US" sz="1100" dirty="0">
+                <a:solidFill>
+                  <a:srgbClr val="AAAAAA"/>
+                </a:solidFill>
+                <a:latin typeface="Arial" pitchFamily="34" charset="0"/>
+                <a:ea typeface="Arial" pitchFamily="34" charset="-122"/>
+                <a:cs typeface="Arial" pitchFamily="34" charset="-120"/>
+              </a:rPr>
+              <a:t>Excel, Outlook &amp; Kalender führen zu Chaos</a:t>
+            </a:r>
+            <a:endParaRPr lang="en-US" sz="1100" dirty="0"/>
+          </a:p>
+        </p:txBody>
+      </p:sp>
+      <p:sp>
+        <p:nvSpPr>
+          <p:cNvPr id="11" name="Shape 9"/>
+          <p:cNvSpPr/>
+          <p:nvPr/>
+        </p:nvSpPr>
+        <p:spPr>
+          <a:xfrm>
+            <a:off x="457200" y="4480560"/>
+            <a:ext cx="3474720" cy="822960"/>
+          </a:xfrm>
+          <a:prstGeom prst="roundRect">
+            <a:avLst>
+              <a:gd name="adj" fmla="val 11111"/>
+            </a:avLst>
+          </a:prstGeom>
+          <a:solidFill>
+            <a:srgbClr val="222222">
+              <a:alpha val="80000"/>
+            </a:srgbClr>
+          </a:solidFill>
+          <a:ln w="12700">
+            <a:solidFill>
+              <a:srgbClr val="FF7932"/>
+            </a:solidFill>
+            <a:prstDash val="solid"/>
+          </a:ln>
+          <a:effectLst>
+            <a:outerShdw sx="100000" sy="100000" kx="0" ky="0" algn="bl" rotWithShape="0" blurRad="101600" dist="25400" dir="5400000">
+              <a:srgbClr val="000000">
+                <a:alpha val="10000"/>
+              </a:srgbClr>
+            </a:outerShdw>
+          </a:effectLst>
+        </p:spPr>
+      </p:sp>
+      <p:sp>
+        <p:nvSpPr>
+          <p:cNvPr id="12" name="Text 10"/>
+          <p:cNvSpPr/>
+          <p:nvPr/>
+        </p:nvSpPr>
+        <p:spPr>
+          <a:xfrm>
+            <a:off x="640080" y="4572000"/>
+            <a:ext cx="3108960" cy="320040"/>
+          </a:xfrm>
+          <a:prstGeom prst="rect">
+            <a:avLst/>
+          </a:prstGeom>
+          <a:noFill/>
+          <a:ln/>
+        </p:spPr>
+        <p:txBody>
+          <a:bodyPr wrap="square" rtlCol="0" anchor="ctr"/>
+          <a:lstStyle/>
+          <a:p>
+            <a:pPr indent="0" marL="0">
+              <a:buNone/>
+            </a:pPr>
+            <a:r>
+              <a:rPr lang="en-US" sz="1800" b="1" dirty="0">
+                <a:solidFill>
+                  <a:srgbClr val="FFFFFF"/>
+                </a:solidFill>
+                <a:latin typeface="Arial" pitchFamily="34" charset="0"/>
+                <a:ea typeface="Arial" pitchFamily="34" charset="-122"/>
+                <a:cs typeface="Arial" pitchFamily="34" charset="-120"/>
+              </a:rPr>
+              <a:t>Fehlende Daten</a:t>
+            </a:r>
+            <a:endParaRPr lang="en-US" sz="1800" dirty="0"/>
+          </a:p>
+        </p:txBody>
+      </p:sp>
+      <p:sp>
+        <p:nvSpPr>
+          <p:cNvPr id="13" name="Text 11"/>
+          <p:cNvSpPr/>
+          <p:nvPr/>
+        </p:nvSpPr>
+        <p:spPr>
+          <a:xfrm>
+            <a:off x="640080" y="4892040"/>
+            <a:ext cx="3108960" cy="320040"/>
+          </a:xfrm>
+          <a:prstGeom prst="rect">
+            <a:avLst/>
+          </a:prstGeom>
+          <a:noFill/>
+          <a:ln/>
+        </p:spPr>
+        <p:txBody>
+          <a:bodyPr wrap="square" rtlCol="0" anchor="ctr"/>
+          <a:lstStyle/>
+          <a:p>
+            <a:pPr indent="0" marL="0">
+              <a:buNone/>
+            </a:pPr>
+            <a:r>
+              <a:rPr lang="en-US" sz="1100" dirty="0">
+                <a:solidFill>
+                  <a:srgbClr val="AAAAAA"/>
+                </a:solidFill>
+                <a:latin typeface="Arial" pitchFamily="34" charset="0"/>
+                <a:ea typeface="Arial" pitchFamily="34" charset="-122"/>
+                <a:cs typeface="Arial" pitchFamily="34" charset="-120"/>
+              </a:rPr>
+              <a:t>Keine KPIs, keine Optimierung möglich</a:t>
+            </a:r>
+            <a:endParaRPr lang="en-US" sz="1100" dirty="0"/>
+          </a:p>
+        </p:txBody>
+      </p:sp>
+      <p:sp>
+        <p:nvSpPr>
+          <p:cNvPr id="14" name="Shape 12"/>
+          <p:cNvSpPr/>
+          <p:nvPr/>
+        </p:nvSpPr>
+        <p:spPr>
+          <a:xfrm>
+            <a:off x="457200" y="5440680"/>
+            <a:ext cx="3474720" cy="822960"/>
+          </a:xfrm>
+          <a:prstGeom prst="roundRect">
+            <a:avLst>
+              <a:gd name="adj" fmla="val 11111"/>
+            </a:avLst>
+          </a:prstGeom>
+          <a:solidFill>
+            <a:srgbClr val="222222">
+              <a:alpha val="80000"/>
+            </a:srgbClr>
+          </a:solidFill>
+          <a:ln w="12700">
+            <a:solidFill>
+              <a:srgbClr val="FF7932"/>
+            </a:solidFill>
+            <a:prstDash val="solid"/>
+          </a:ln>
+          <a:effectLst>
+            <a:outerShdw sx="100000" sy="100000" kx="0" ky="0" algn="bl" rotWithShape="0" blurRad="101600" dist="25400" dir="5400000">
+              <a:srgbClr val="000000">
+                <a:alpha val="10000"/>
+              </a:srgbClr>
+            </a:outerShdw>
+          </a:effectLst>
+        </p:spPr>
+      </p:sp>
+      <p:sp>
+        <p:nvSpPr>
+          <p:cNvPr id="15" name="Text 13"/>
+          <p:cNvSpPr/>
+          <p:nvPr/>
+        </p:nvSpPr>
+        <p:spPr>
+          <a:xfrm>
+            <a:off x="640080" y="5532120"/>
+            <a:ext cx="3108960" cy="320040"/>
+          </a:xfrm>
+          <a:prstGeom prst="rect">
+            <a:avLst/>
+          </a:prstGeom>
+          <a:noFill/>
+          <a:ln/>
+        </p:spPr>
+        <p:txBody>
+          <a:bodyPr wrap="square" rtlCol="0" anchor="ctr"/>
+          <a:lstStyle/>
+          <a:p>
+            <a:pPr indent="0" marL="0">
+              <a:buNone/>
+            </a:pPr>
+            <a:r>
+              <a:rPr lang="en-US" sz="1800" b="1" dirty="0">
+                <a:solidFill>
+                  <a:srgbClr val="FFFFFF"/>
+                </a:solidFill>
+                <a:latin typeface="Arial" pitchFamily="34" charset="0"/>
+                <a:ea typeface="Arial" pitchFamily="34" charset="-122"/>
+                <a:cs typeface="Arial" pitchFamily="34" charset="-120"/>
+              </a:rPr>
+              <a:t>Hohe Leerlaufzeit</a:t>
+            </a:r>
+            <a:endParaRPr lang="en-US" sz="1800" dirty="0"/>
+          </a:p>
+        </p:txBody>
+      </p:sp>
+      <p:sp>
+        <p:nvSpPr>
+          <p:cNvPr id="16" name="Text 14"/>
+          <p:cNvSpPr/>
+          <p:nvPr/>
+        </p:nvSpPr>
+        <p:spPr>
+          <a:xfrm>
+            <a:off x="640080" y="5852160"/>
+            <a:ext cx="3108960" cy="320040"/>
+          </a:xfrm>
+          <a:prstGeom prst="rect">
+            <a:avLst/>
+          </a:prstGeom>
+          <a:noFill/>
+          <a:ln/>
+        </p:spPr>
+        <p:txBody>
+          <a:bodyPr wrap="square" rtlCol="0" anchor="ctr"/>
+          <a:lstStyle/>
+          <a:p>
+            <a:pPr indent="0" marL="0">
+              <a:buNone/>
+            </a:pPr>
+            <a:r>
+              <a:rPr lang="en-US" sz="1100" dirty="0">
+                <a:solidFill>
+                  <a:srgbClr val="AAAAAA"/>
+                </a:solidFill>
+                <a:latin typeface="Arial" pitchFamily="34" charset="0"/>
+                <a:ea typeface="Arial" pitchFamily="34" charset="-122"/>
+                <a:cs typeface="Arial" pitchFamily="34" charset="-120"/>
+              </a:rPr>
+              <a:t>2,5 Stunden täglich pro Fahrzeug</a:t>
+            </a:r>
+            <a:endParaRPr lang="en-US" sz="1100" dirty="0"/>
+          </a:p>
+        </p:txBody>
+      </p:sp>
+      <p:sp>
+        <p:nvSpPr>
+          <p:cNvPr id="17" name="Text 15"/>
+          <p:cNvSpPr/>
+          <p:nvPr/>
+        </p:nvSpPr>
+        <p:spPr>
+          <a:xfrm>
+            <a:off x="4572000" y="2286000"/>
+            <a:ext cx="6858000" cy="1645920"/>
+          </a:xfrm>
+          <a:prstGeom prst="rect">
+            <a:avLst/>
+          </a:prstGeom>
+          <a:noFill/>
+          <a:ln/>
+        </p:spPr>
+        <p:txBody>
+          <a:bodyPr wrap="square" rtlCol="0" anchor="ctr"/>
+          <a:lstStyle/>
+          <a:p>
+            <a:pPr algn="ctr" indent="0" marL="0">
+              <a:buNone/>
+            </a:pPr>
+            <a:r>
+              <a:rPr lang="en-US" sz="12000" b="1" dirty="0">
+                <a:solidFill>
+                  <a:srgbClr val="FF7932"/>
+                </a:solidFill>
+                <a:latin typeface="Arial Black" pitchFamily="34" charset="0"/>
+                <a:ea typeface="Arial Black" pitchFamily="34" charset="-122"/>
+                <a:cs typeface="Arial Black" pitchFamily="34" charset="-120"/>
+              </a:rPr>
+              <a:t>30 Tage</a:t>
+            </a:r>
+            <a:endParaRPr lang="en-US" sz="12000" dirty="0"/>
+          </a:p>
+        </p:txBody>
+      </p:sp>
+      <p:sp>
+        <p:nvSpPr>
+          <p:cNvPr id="18" name="Text 16"/>
+          <p:cNvSpPr/>
+          <p:nvPr/>
+        </p:nvSpPr>
+        <p:spPr>
+          <a:xfrm>
+            <a:off x="4572000" y="4114800"/>
+            <a:ext cx="6858000" cy="548640"/>
+          </a:xfrm>
+          <a:prstGeom prst="rect">
+            <a:avLst/>
+          </a:prstGeom>
+          <a:noFill/>
+          <a:ln/>
+        </p:spPr>
+        <p:txBody>
+          <a:bodyPr wrap="square" rtlCol="0" anchor="ctr"/>
+          <a:lstStyle/>
+          <a:p>
+            <a:pPr algn="ctr" indent="0" marL="0">
+              <a:lnSpc>
+                <a:spcPts val="2800"/>
+              </a:lnSpc>
+              <a:buNone/>
+            </a:pPr>
+            <a:r>
+              <a:rPr lang="en-US" sz="2000" dirty="0">
+                <a:solidFill>
+                  <a:srgbClr val="FFFFFF"/>
+                </a:solidFill>
+                <a:latin typeface="Arial" pitchFamily="34" charset="0"/>
+                <a:ea typeface="Arial" pitchFamily="34" charset="-122"/>
+                <a:cs typeface="Arial" pitchFamily="34" charset="-120"/>
+              </a:rPr>
+              <a:t>durchschnittliche Wartezeit auf Fahrzeuge</a:t>
+            </a:r>
+            <a:endParaRPr lang="en-US" sz="2000" dirty="0"/>
+          </a:p>
+        </p:txBody>
+      </p:sp>
+    </p:spTree>
+  </p:cSld>
+  <p:clrMapOvr>
+    <a:masterClrMapping/>
+  </p:clrMapOvr>
+</p:sld>
+</file>
+
+<file path=ppt/slides/slide3.xml><?xml version="1.0" encoding="utf-8"?>
+<p:sld xmlns:a="http://schemas.openxmlformats.org/drawingml/2006/main" xmlns:r="http://schemas.openxmlformats.org/officeDocument/2006/relationships" xmlns:p="http://schemas.openxmlformats.org/presentationml/2006/main">
+  <p:cSld name="Slide 3">
+    <p:bg>
+      <p:bgPr>
+        <a:solidFill>
+          <a:srgbClr val="0D0D0D"/>
+        </a:solidFill>
+      </p:bgPr>
+    </p:bg>
+    <p:spTree>
+      <p:nvGrpSpPr>
+        <p:cNvPr id="1" name=""/>
+        <p:cNvGrpSpPr/>
+        <p:nvPr/>
+      </p:nvGrpSpPr>
+      <p:grpSpPr>
+        <a:xfrm>
+          <a:off x="0" y="0"/>
+          <a:ext cx="0" cy="0"/>
+          <a:chOff x="0" y="0"/>
+          <a:chExt cx="0" cy="0"/>
+        </a:xfrm>
+      </p:grpSpPr>
+      <p:sp>
+        <p:nvSpPr>
+          <p:cNvPr id="2" name="Shape 0"/>
+          <p:cNvSpPr/>
+          <p:nvPr/>
+        </p:nvSpPr>
+        <p:spPr>
+          <a:xfrm rot="-720000">
+            <a:off x="-1828800" y="4114800"/>
+            <a:ext cx="16459200" cy="2743200"/>
+          </a:xfrm>
+          <a:prstGeom prst="rect">
+            <a:avLst/>
+          </a:prstGeom>
+          <a:solidFill>
+            <a:srgbClr val="FF7932">
+              <a:alpha val="15000"/>
+            </a:srgbClr>
+          </a:solidFill>
+          <a:ln w="12700">
+            <a:solidFill>
+              <a:srgbClr val="333333"/>
+            </a:solidFill>
+            <a:prstDash val="solid"/>
+          </a:ln>
+        </p:spPr>
+      </p:sp>
+      <p:sp>
+        <p:nvSpPr>
+          <p:cNvPr id="3" name="Text 1"/>
+          <p:cNvSpPr/>
+          <p:nvPr/>
+        </p:nvSpPr>
+        <p:spPr>
+          <a:xfrm>
+            <a:off x="731520" y="731520"/>
+            <a:ext cx="4572000" cy="457200"/>
+          </a:xfrm>
+          <a:prstGeom prst="rect">
+            <a:avLst/>
+          </a:prstGeom>
+          <a:noFill/>
+          <a:ln/>
+        </p:spPr>
+        <p:txBody>
+          <a:bodyPr wrap="square" rtlCol="0" anchor="ctr"/>
+          <a:lstStyle/>
+          <a:p>
+            <a:pPr indent="0" marL="0">
+              <a:buNone/>
+            </a:pPr>
+            <a:r>
+              <a:rPr lang="en-US" sz="1400" b="1" dirty="0">
+                <a:solidFill>
+                  <a:srgbClr val="FF7932"/>
+                </a:solidFill>
+                <a:latin typeface="Arial" pitchFamily="34" charset="0"/>
+                <a:ea typeface="Arial" pitchFamily="34" charset="-122"/>
+                <a:cs typeface="Arial" pitchFamily="34" charset="-120"/>
+              </a:rPr>
+              <a:t>DIE LÖSUNG</a:t>
+            </a:r>
+            <a:endParaRPr lang="en-US" sz="1400" dirty="0"/>
+          </a:p>
+        </p:txBody>
+      </p:sp>
+      <p:sp>
+        <p:nvSpPr>
+          <p:cNvPr id="4" name="Text 2"/>
+          <p:cNvSpPr/>
+          <p:nvPr/>
+        </p:nvSpPr>
+        <p:spPr>
+          <a:xfrm>
+            <a:off x="731520" y="1280160"/>
+            <a:ext cx="9144000" cy="914400"/>
+          </a:xfrm>
+          <a:prstGeom prst="rect">
+            <a:avLst/>
+          </a:prstGeom>
+          <a:noFill/>
+          <a:ln/>
+        </p:spPr>
+        <p:txBody>
+          <a:bodyPr wrap="square" rtlCol="0" anchor="ctr"/>
+          <a:lstStyle/>
+          <a:p>
+            <a:pPr indent="0" marL="0">
+              <a:buNone/>
+            </a:pPr>
+            <a:r>
+              <a:rPr lang="en-US" sz="4400" b="1" dirty="0">
+                <a:solidFill>
+                  <a:srgbClr val="FFFFFF"/>
+                </a:solidFill>
+                <a:latin typeface="Arial" pitchFamily="34" charset="0"/>
+                <a:ea typeface="Arial" pitchFamily="34" charset="-122"/>
+                <a:cs typeface="Arial" pitchFamily="34" charset="-120"/>
+              </a:rPr>
+              <a:t>Eine Software für alle Standorte</a:t>
+            </a:r>
+            <a:endParaRPr lang="en-US" sz="4400" dirty="0"/>
+          </a:p>
+        </p:txBody>
+      </p:sp>
+      <p:sp>
+        <p:nvSpPr>
+          <p:cNvPr id="5" name="Shape 3"/>
+          <p:cNvSpPr/>
+          <p:nvPr/>
+        </p:nvSpPr>
+        <p:spPr>
+          <a:xfrm>
+            <a:off x="731520" y="2560320"/>
+            <a:ext cx="73152" cy="1097280"/>
+          </a:xfrm>
+          <a:prstGeom prst="rect">
+            <a:avLst/>
+          </a:prstGeom>
+          <a:solidFill>
+            <a:srgbClr val="FF7932"/>
+          </a:solidFill>
+          <a:ln w="12700">
+            <a:solidFill>
+              <a:srgbClr val="333333"/>
+            </a:solidFill>
+            <a:prstDash val="solid"/>
+          </a:ln>
+        </p:spPr>
+      </p:sp>
+      <p:sp>
+        <p:nvSpPr>
+          <p:cNvPr id="6" name="Text 4"/>
+          <p:cNvSpPr/>
+          <p:nvPr/>
+        </p:nvSpPr>
+        <p:spPr>
+          <a:xfrm>
+            <a:off x="1005840" y="2606040"/>
+            <a:ext cx="4572000" cy="457200"/>
+          </a:xfrm>
+          <a:prstGeom prst="rect">
+            <a:avLst/>
+          </a:prstGeom>
+          <a:noFill/>
+          <a:ln/>
+        </p:spPr>
+        <p:txBody>
+          <a:bodyPr wrap="square" rtlCol="0" anchor="ctr"/>
+          <a:lstStyle/>
+          <a:p>
+            <a:pPr indent="0" marL="0">
+              <a:buNone/>
+            </a:pPr>
+            <a:r>
+              <a:rPr lang="en-US" sz="2200" b="1" dirty="0">
+                <a:solidFill>
+                  <a:srgbClr val="FFFFFF"/>
+                </a:solidFill>
+                <a:latin typeface="Arial" pitchFamily="34" charset="0"/>
+                <a:ea typeface="Arial" pitchFamily="34" charset="-122"/>
+                <a:cs typeface="Arial" pitchFamily="34" charset="-120"/>
+              </a:rPr>
+              <a:t>Synergien nutzen</a:t>
+            </a:r>
+            <a:endParaRPr lang="en-US" sz="2200" dirty="0"/>
+          </a:p>
+        </p:txBody>
+      </p:sp>
+      <p:sp>
+        <p:nvSpPr>
+          <p:cNvPr id="7" name="Text 5"/>
+          <p:cNvSpPr/>
+          <p:nvPr/>
+        </p:nvSpPr>
+        <p:spPr>
+          <a:xfrm>
+            <a:off x="1005840" y="3063240"/>
+            <a:ext cx="4572000" cy="457200"/>
+          </a:xfrm>
+          <a:prstGeom prst="rect">
+            <a:avLst/>
+          </a:prstGeom>
+          <a:noFill/>
+          <a:ln/>
+        </p:spPr>
+        <p:txBody>
+          <a:bodyPr wrap="square" rtlCol="0" anchor="ctr"/>
+          <a:lstStyle/>
+          <a:p>
+            <a:pPr indent="0" marL="0">
+              <a:lnSpc>
+                <a:spcPts val="2400"/>
+              </a:lnSpc>
+              <a:buNone/>
+            </a:pPr>
+            <a:r>
+              <a:rPr lang="en-US" sz="1600" dirty="0">
+                <a:solidFill>
+                  <a:srgbClr val="BBBBBB"/>
+                </a:solidFill>
+                <a:latin typeface="Arial" pitchFamily="34" charset="0"/>
+                <a:ea typeface="Arial" pitchFamily="34" charset="-122"/>
+                <a:cs typeface="Arial" pitchFamily="34" charset="-120"/>
+              </a:rPr>
+              <a:t>Vernetzung aller Standorte</a:t>
+            </a:r>
+            <a:endParaRPr lang="en-US" sz="1600" dirty="0"/>
+          </a:p>
+        </p:txBody>
+      </p:sp>
+      <p:sp>
+        <p:nvSpPr>
+          <p:cNvPr id="8" name="Shape 6"/>
+          <p:cNvSpPr/>
+          <p:nvPr/>
+        </p:nvSpPr>
+        <p:spPr>
+          <a:xfrm>
+            <a:off x="6217920" y="2560320"/>
+            <a:ext cx="73152" cy="1097280"/>
+          </a:xfrm>
+          <a:prstGeom prst="rect">
+            <a:avLst/>
+          </a:prstGeom>
+          <a:solidFill>
+            <a:srgbClr val="FF7932"/>
+          </a:solidFill>
+          <a:ln w="12700">
+            <a:solidFill>
+              <a:srgbClr val="333333"/>
+            </a:solidFill>
+            <a:prstDash val="solid"/>
+          </a:ln>
+        </p:spPr>
+      </p:sp>
+      <p:sp>
+        <p:nvSpPr>
+          <p:cNvPr id="9" name="Text 7"/>
+          <p:cNvSpPr/>
+          <p:nvPr/>
+        </p:nvSpPr>
+        <p:spPr>
+          <a:xfrm>
+            <a:off x="6492240" y="2606040"/>
+            <a:ext cx="4572000" cy="457200"/>
+          </a:xfrm>
+          <a:prstGeom prst="rect">
+            <a:avLst/>
+          </a:prstGeom>
+          <a:noFill/>
+          <a:ln/>
+        </p:spPr>
+        <p:txBody>
+          <a:bodyPr wrap="square" rtlCol="0" anchor="ctr"/>
+          <a:lstStyle/>
+          <a:p>
+            <a:pPr indent="0" marL="0">
+              <a:buNone/>
+            </a:pPr>
+            <a:r>
+              <a:rPr lang="en-US" sz="2200" b="1" dirty="0">
+                <a:solidFill>
+                  <a:srgbClr val="FFFFFF"/>
+                </a:solidFill>
+                <a:latin typeface="Arial" pitchFamily="34" charset="0"/>
+                <a:ea typeface="Arial" pitchFamily="34" charset="-122"/>
+                <a:cs typeface="Arial" pitchFamily="34" charset="-120"/>
+              </a:rPr>
+              <a:t>Effizienz steigern</a:t>
+            </a:r>
+            <a:endParaRPr lang="en-US" sz="2200" dirty="0"/>
+          </a:p>
+        </p:txBody>
+      </p:sp>
+      <p:sp>
+        <p:nvSpPr>
+          <p:cNvPr id="10" name="Text 8"/>
+          <p:cNvSpPr/>
+          <p:nvPr/>
+        </p:nvSpPr>
+        <p:spPr>
+          <a:xfrm>
+            <a:off x="6492240" y="3063240"/>
+            <a:ext cx="4572000" cy="457200"/>
+          </a:xfrm>
+          <a:prstGeom prst="rect">
+            <a:avLst/>
+          </a:prstGeom>
+          <a:noFill/>
+          <a:ln/>
+        </p:spPr>
+        <p:txBody>
+          <a:bodyPr wrap="square" rtlCol="0" anchor="ctr"/>
+          <a:lstStyle/>
+          <a:p>
+            <a:pPr indent="0" marL="0">
+              <a:lnSpc>
+                <a:spcPts val="2400"/>
+              </a:lnSpc>
+              <a:buNone/>
+            </a:pPr>
+            <a:r>
+              <a:rPr lang="en-US" sz="1600" dirty="0">
+                <a:solidFill>
+                  <a:srgbClr val="BBBBBB"/>
+                </a:solidFill>
+                <a:latin typeface="Arial" pitchFamily="34" charset="0"/>
+                <a:ea typeface="Arial" pitchFamily="34" charset="-122"/>
+                <a:cs typeface="Arial" pitchFamily="34" charset="-120"/>
+              </a:rPr>
+              <a:t>Optimierte Fahrzeugnutzung</a:t>
+            </a:r>
+            <a:endParaRPr lang="en-US" sz="1600" dirty="0"/>
+          </a:p>
+        </p:txBody>
+      </p:sp>
+      <p:sp>
+        <p:nvSpPr>
+          <p:cNvPr id="11" name="Shape 9"/>
+          <p:cNvSpPr/>
+          <p:nvPr/>
+        </p:nvSpPr>
+        <p:spPr>
+          <a:xfrm>
+            <a:off x="731520" y="4206240"/>
+            <a:ext cx="73152" cy="1097280"/>
+          </a:xfrm>
+          <a:prstGeom prst="rect">
+            <a:avLst/>
+          </a:prstGeom>
+          <a:solidFill>
+            <a:srgbClr val="FF7932"/>
+          </a:solidFill>
+          <a:ln w="12700">
+            <a:solidFill>
+              <a:srgbClr val="333333"/>
+            </a:solidFill>
+            <a:prstDash val="solid"/>
+          </a:ln>
+        </p:spPr>
+      </p:sp>
+      <p:sp>
+        <p:nvSpPr>
+          <p:cNvPr id="12" name="Text 10"/>
+          <p:cNvSpPr/>
+          <p:nvPr/>
+        </p:nvSpPr>
+        <p:spPr>
+          <a:xfrm>
+            <a:off x="1005840" y="4251960"/>
+            <a:ext cx="4572000" cy="457200"/>
+          </a:xfrm>
+          <a:prstGeom prst="rect">
+            <a:avLst/>
+          </a:prstGeom>
+          <a:noFill/>
+          <a:ln/>
+        </p:spPr>
+        <p:txBody>
+          <a:bodyPr wrap="square" rtlCol="0" anchor="ctr"/>
+          <a:lstStyle/>
+          <a:p>
+            <a:pPr indent="0" marL="0">
+              <a:buNone/>
+            </a:pPr>
+            <a:r>
+              <a:rPr lang="en-US" sz="2200" b="1" dirty="0">
+                <a:solidFill>
+                  <a:srgbClr val="FFFFFF"/>
+                </a:solidFill>
+                <a:latin typeface="Arial" pitchFamily="34" charset="0"/>
+                <a:ea typeface="Arial" pitchFamily="34" charset="-122"/>
+                <a:cs typeface="Arial" pitchFamily="34" charset="-120"/>
+              </a:rPr>
+              <a:t>Automatisierung</a:t>
+            </a:r>
+            <a:endParaRPr lang="en-US" sz="2200" dirty="0"/>
+          </a:p>
+        </p:txBody>
+      </p:sp>
+      <p:sp>
+        <p:nvSpPr>
+          <p:cNvPr id="13" name="Text 11"/>
+          <p:cNvSpPr/>
+          <p:nvPr/>
+        </p:nvSpPr>
+        <p:spPr>
+          <a:xfrm>
+            <a:off x="1005840" y="4709160"/>
+            <a:ext cx="4572000" cy="457200"/>
+          </a:xfrm>
+          <a:prstGeom prst="rect">
+            <a:avLst/>
+          </a:prstGeom>
+          <a:noFill/>
+          <a:ln/>
+        </p:spPr>
+        <p:txBody>
+          <a:bodyPr wrap="square" rtlCol="0" anchor="ctr"/>
+          <a:lstStyle/>
+          <a:p>
+            <a:pPr indent="0" marL="0">
+              <a:lnSpc>
+                <a:spcPts val="2400"/>
+              </a:lnSpc>
+              <a:buNone/>
+            </a:pPr>
+            <a:r>
+              <a:rPr lang="en-US" sz="1600" dirty="0">
+                <a:solidFill>
+                  <a:srgbClr val="BBBBBB"/>
+                </a:solidFill>
+                <a:latin typeface="Arial" pitchFamily="34" charset="0"/>
+                <a:ea typeface="Arial" pitchFamily="34" charset="-122"/>
+                <a:cs typeface="Arial" pitchFamily="34" charset="-120"/>
+              </a:rPr>
+              <a:t>Weniger manuelle Arbeit</a:t>
+            </a:r>
+            <a:endParaRPr lang="en-US" sz="1600" dirty="0"/>
+          </a:p>
+        </p:txBody>
+      </p:sp>
+      <p:sp>
+        <p:nvSpPr>
+          <p:cNvPr id="14" name="Shape 12"/>
+          <p:cNvSpPr/>
+          <p:nvPr/>
+        </p:nvSpPr>
+        <p:spPr>
+          <a:xfrm>
+            <a:off x="6217920" y="4206240"/>
+            <a:ext cx="73152" cy="1097280"/>
+          </a:xfrm>
+          <a:prstGeom prst="rect">
+            <a:avLst/>
+          </a:prstGeom>
+          <a:solidFill>
+            <a:srgbClr val="FF7932"/>
+          </a:solidFill>
+          <a:ln w="12700">
+            <a:solidFill>
+              <a:srgbClr val="333333"/>
+            </a:solidFill>
+            <a:prstDash val="solid"/>
+          </a:ln>
+        </p:spPr>
+      </p:sp>
+      <p:sp>
+        <p:nvSpPr>
+          <p:cNvPr id="15" name="Text 13"/>
+          <p:cNvSpPr/>
+          <p:nvPr/>
+        </p:nvSpPr>
+        <p:spPr>
+          <a:xfrm>
+            <a:off x="6492240" y="4251960"/>
+            <a:ext cx="4572000" cy="457200"/>
+          </a:xfrm>
+          <a:prstGeom prst="rect">
+            <a:avLst/>
+          </a:prstGeom>
+          <a:noFill/>
+          <a:ln/>
+        </p:spPr>
+        <p:txBody>
+          <a:bodyPr wrap="square" rtlCol="0" anchor="ctr"/>
+          <a:lstStyle/>
+          <a:p>
+            <a:pPr indent="0" marL="0">
+              <a:buNone/>
+            </a:pPr>
+            <a:r>
+              <a:rPr lang="en-US" sz="2200" b="1" dirty="0">
+                <a:solidFill>
+                  <a:srgbClr val="FFFFFF"/>
+                </a:solidFill>
+                <a:latin typeface="Arial" pitchFamily="34" charset="0"/>
+                <a:ea typeface="Arial" pitchFamily="34" charset="-122"/>
+                <a:cs typeface="Arial" pitchFamily="34" charset="-120"/>
+              </a:rPr>
+              <a:t>Kosteneinsparung</a:t>
+            </a:r>
+            <a:endParaRPr lang="en-US" sz="2200" dirty="0"/>
+          </a:p>
+        </p:txBody>
+      </p:sp>
+      <p:sp>
+        <p:nvSpPr>
+          <p:cNvPr id="16" name="Text 14"/>
+          <p:cNvSpPr/>
+          <p:nvPr/>
+        </p:nvSpPr>
+        <p:spPr>
+          <a:xfrm>
+            <a:off x="6492240" y="4709160"/>
+            <a:ext cx="4572000" cy="457200"/>
+          </a:xfrm>
+          <a:prstGeom prst="rect">
+            <a:avLst/>
+          </a:prstGeom>
+          <a:noFill/>
+          <a:ln/>
+        </p:spPr>
+        <p:txBody>
+          <a:bodyPr wrap="square" rtlCol="0" anchor="ctr"/>
+          <a:lstStyle/>
+          <a:p>
+            <a:pPr indent="0" marL="0">
+              <a:lnSpc>
+                <a:spcPts val="2400"/>
+              </a:lnSpc>
+              <a:buNone/>
+            </a:pPr>
+            <a:r>
+              <a:rPr lang="en-US" sz="1600" dirty="0">
+                <a:solidFill>
+                  <a:srgbClr val="BBBBBB"/>
+                </a:solidFill>
+                <a:latin typeface="Arial" pitchFamily="34" charset="0"/>
+                <a:ea typeface="Arial" pitchFamily="34" charset="-122"/>
+                <a:cs typeface="Arial" pitchFamily="34" charset="-120"/>
+              </a:rPr>
+              <a:t>260.000 € jährlich</a:t>
+            </a:r>
+            <a:endParaRPr lang="en-US" sz="1600" dirty="0"/>
+          </a:p>
+        </p:txBody>
+      </p:sp>
+    </p:spTree>
+  </p:cSld>
+  <p:clrMapOvr>
+    <a:masterClrMapping/>
+  </p:clrMapOvr>
+</p:sld>
+</file>
+
+<file path=ppt/slides/slide4.xml><?xml version="1.0" encoding="utf-8"?>
+<p:sld xmlns:a="http://schemas.openxmlformats.org/drawingml/2006/main" xmlns:r="http://schemas.openxmlformats.org/officeDocument/2006/relationships" xmlns:p="http://schemas.openxmlformats.org/presentationml/2006/main">
+  <p:cSld name="Slide 4">
+    <p:bg>
+      <p:bgPr>
+        <a:solidFill>
+          <a:srgbClr val="0D0D0D"/>
+        </a:solidFill>
+      </p:bgPr>
+    </p:bg>
+    <p:spTree>
+      <p:nvGrpSpPr>
+        <p:cNvPr id="1" name=""/>
+        <p:cNvGrpSpPr/>
+        <p:nvPr/>
+      </p:nvGrpSpPr>
+      <p:grpSpPr>
+        <a:xfrm>
+          <a:off x="0" y="0"/>
+          <a:ext cx="0" cy="0"/>
+          <a:chOff x="0" y="0"/>
+          <a:chExt cx="0" cy="0"/>
+        </a:xfrm>
+      </p:grpSpPr>
+      <p:sp>
+        <p:nvSpPr>
+          <p:cNvPr id="2" name="Text 0"/>
+          <p:cNvSpPr/>
+          <p:nvPr/>
+        </p:nvSpPr>
+        <p:spPr>
+          <a:xfrm>
+            <a:off x="731520" y="548640"/>
+            <a:ext cx="5486400" cy="365760"/>
+          </a:xfrm>
+          <a:prstGeom prst="rect">
+            <a:avLst/>
+          </a:prstGeom>
+          <a:noFill/>
+          <a:ln/>
+        </p:spPr>
+        <p:txBody>
+          <a:bodyPr wrap="square" rtlCol="0" anchor="ctr"/>
+          <a:lstStyle/>
+          <a:p>
+            <a:pPr indent="0" marL="0">
+              <a:buNone/>
+            </a:pPr>
+            <a:r>
+              <a:rPr lang="en-US" sz="1200" b="1" dirty="0">
+                <a:solidFill>
+                  <a:srgbClr val="FF7932"/>
+                </a:solidFill>
+                <a:latin typeface="Arial" pitchFamily="34" charset="0"/>
+                <a:ea typeface="Arial" pitchFamily="34" charset="-122"/>
+                <a:cs typeface="Arial" pitchFamily="34" charset="-120"/>
+              </a:rPr>
+              <a:t>MINIMUM VIABLE PRODUCT</a:t>
+            </a:r>
+            <a:endParaRPr lang="en-US" sz="1200" dirty="0"/>
+          </a:p>
+        </p:txBody>
+      </p:sp>
+      <p:sp>
+        <p:nvSpPr>
+          <p:cNvPr id="3" name="Text 1"/>
+          <p:cNvSpPr/>
+          <p:nvPr/>
+        </p:nvSpPr>
+        <p:spPr>
+          <a:xfrm>
+            <a:off x="731520" y="1005840"/>
+            <a:ext cx="9144000" cy="731520"/>
+          </a:xfrm>
+          <a:prstGeom prst="rect">
+            <a:avLst/>
+          </a:prstGeom>
+          <a:noFill/>
+          <a:ln/>
+        </p:spPr>
+        <p:txBody>
+          <a:bodyPr wrap="square" rtlCol="0" anchor="ctr"/>
+          <a:lstStyle/>
+          <a:p>
+            <a:pPr indent="0" marL="0">
+              <a:buNone/>
+            </a:pPr>
+            <a:r>
+              <a:rPr lang="en-US" sz="4000" b="1" dirty="0">
+                <a:solidFill>
+                  <a:srgbClr val="FFFFFF"/>
+                </a:solidFill>
+                <a:latin typeface="Arial" pitchFamily="34" charset="0"/>
+                <a:ea typeface="Arial" pitchFamily="34" charset="-122"/>
+                <a:cs typeface="Arial" pitchFamily="34" charset="-120"/>
+              </a:rPr>
+              <a:t>Die Kernfunktionen</a:t>
+            </a:r>
+            <a:endParaRPr lang="en-US" sz="4000" dirty="0"/>
+          </a:p>
+        </p:txBody>
+      </p:sp>
+      <p:sp>
+        <p:nvSpPr>
+          <p:cNvPr id="4" name="Shape 2"/>
+          <p:cNvSpPr/>
+          <p:nvPr/>
+        </p:nvSpPr>
+        <p:spPr>
+          <a:xfrm>
+            <a:off x="731520" y="2011680"/>
+            <a:ext cx="3291840" cy="1645920"/>
+          </a:xfrm>
+          <a:prstGeom prst="roundRect">
+            <a:avLst>
+              <a:gd name="adj" fmla="val 6667"/>
+            </a:avLst>
+          </a:prstGeom>
+          <a:solidFill>
+            <a:srgbClr val="1A1A1A">
+              <a:alpha val="60000"/>
+            </a:srgbClr>
+          </a:solidFill>
+          <a:ln w="12700">
+            <a:solidFill>
+              <a:srgbClr val="FF7932"/>
+            </a:solidFill>
+            <a:prstDash val="solid"/>
+          </a:ln>
+          <a:effectLst>
+            <a:outerShdw sx="100000" sy="100000" kx="0" ky="0" algn="bl" rotWithShape="0" blurRad="304800" dist="101600" dir="8100000">
+              <a:srgbClr val="000000">
+                <a:alpha val="25000"/>
+              </a:srgbClr>
+            </a:outerShdw>
+          </a:effectLst>
+        </p:spPr>
+      </p:sp>
+      <p:sp>
+        <p:nvSpPr>
+          <p:cNvPr id="5" name="Text 3"/>
+          <p:cNvSpPr/>
+          <p:nvPr/>
+        </p:nvSpPr>
+        <p:spPr>
+          <a:xfrm>
+            <a:off x="914400" y="2148840"/>
+            <a:ext cx="914400" cy="457200"/>
+          </a:xfrm>
+          <a:prstGeom prst="rect">
+            <a:avLst/>
+          </a:prstGeom>
+          <a:noFill/>
+          <a:ln/>
+        </p:spPr>
+        <p:txBody>
+          <a:bodyPr wrap="square" rtlCol="0" anchor="ctr"/>
+          <a:lstStyle/>
+          <a:p>
+            <a:pPr indent="0" marL="0">
+              <a:buNone/>
+            </a:pPr>
+            <a:r>
+              <a:rPr lang="en-US" sz="2800" b="1" dirty="0">
+                <a:solidFill>
+                  <a:srgbClr val="FF7932"/>
+                </a:solidFill>
+                <a:latin typeface="Arial Black" pitchFamily="34" charset="0"/>
+                <a:ea typeface="Arial Black" pitchFamily="34" charset="-122"/>
+                <a:cs typeface="Arial Black" pitchFamily="34" charset="-120"/>
+              </a:rPr>
+              <a:t>01</a:t>
+            </a:r>
+            <a:endParaRPr lang="en-US" sz="2800" dirty="0"/>
+          </a:p>
+        </p:txBody>
+      </p:sp>
+      <p:sp>
+        <p:nvSpPr>
+          <p:cNvPr id="6" name="Text 4"/>
+          <p:cNvSpPr/>
+          <p:nvPr/>
+        </p:nvSpPr>
+        <p:spPr>
+          <a:xfrm>
+            <a:off x="914400" y="2651760"/>
+            <a:ext cx="2926080" cy="731520"/>
+          </a:xfrm>
+          <a:prstGeom prst="rect">
+            <a:avLst/>
+          </a:prstGeom>
+          <a:noFill/>
+          <a:ln/>
+        </p:spPr>
+        <p:txBody>
+          <a:bodyPr wrap="square" rtlCol="0" anchor="ctr"/>
+          <a:lstStyle/>
+          <a:p>
+            <a:pPr indent="0" marL="0">
+              <a:buNone/>
+            </a:pPr>
+            <a:r>
+              <a:rPr lang="en-US" sz="1800" b="1" dirty="0">
+                <a:solidFill>
+                  <a:srgbClr val="FFFFFF"/>
+                </a:solidFill>
+                <a:latin typeface="Arial" pitchFamily="34" charset="0"/>
+                <a:ea typeface="Arial" pitchFamily="34" charset="-122"/>
+                <a:cs typeface="Arial" pitchFamily="34" charset="-120"/>
+              </a:rPr>
+              <a:t>Planungsalgorithmus</a:t>
+            </a:r>
+            <a:endParaRPr lang="en-US" sz="1800" dirty="0"/>
+          </a:p>
+        </p:txBody>
+      </p:sp>
+      <p:sp>
+        <p:nvSpPr>
+          <p:cNvPr id="7" name="Text 5"/>
+          <p:cNvSpPr/>
+          <p:nvPr/>
+        </p:nvSpPr>
+        <p:spPr>
+          <a:xfrm>
+            <a:off x="914400" y="3200400"/>
+            <a:ext cx="2926080" cy="365760"/>
+          </a:xfrm>
+          <a:prstGeom prst="rect">
+            <a:avLst/>
+          </a:prstGeom>
+          <a:noFill/>
+          <a:ln/>
+        </p:spPr>
+        <p:txBody>
+          <a:bodyPr wrap="square" rtlCol="0" anchor="ctr"/>
+          <a:lstStyle/>
+          <a:p>
+            <a:pPr indent="0" marL="0">
+              <a:buNone/>
+            </a:pPr>
+            <a:r>
+              <a:rPr lang="en-US" sz="1100" dirty="0">
+                <a:solidFill>
+                  <a:srgbClr val="999999"/>
+                </a:solidFill>
+                <a:latin typeface="Arial" pitchFamily="34" charset="0"/>
+                <a:ea typeface="Arial" pitchFamily="34" charset="-122"/>
+                <a:cs typeface="Arial" pitchFamily="34" charset="-120"/>
+              </a:rPr>
+              <a:t>Optimierte Tourenplanung</a:t>
+            </a:r>
+            <a:endParaRPr lang="en-US" sz="1100" dirty="0"/>
+          </a:p>
+        </p:txBody>
+      </p:sp>
+      <p:sp>
+        <p:nvSpPr>
+          <p:cNvPr id="8" name="Shape 6"/>
+          <p:cNvSpPr/>
+          <p:nvPr/>
+        </p:nvSpPr>
+        <p:spPr>
+          <a:xfrm>
+            <a:off x="4389120" y="2011680"/>
+            <a:ext cx="3291840" cy="1645920"/>
+          </a:xfrm>
+          <a:prstGeom prst="roundRect">
+            <a:avLst>
+              <a:gd name="adj" fmla="val 6667"/>
+            </a:avLst>
+          </a:prstGeom>
+          <a:solidFill>
+            <a:srgbClr val="1A1A1A">
+              <a:alpha val="60000"/>
+            </a:srgbClr>
+          </a:solidFill>
+          <a:ln w="12700">
+            <a:solidFill>
+              <a:srgbClr val="FF7932"/>
+            </a:solidFill>
+            <a:prstDash val="solid"/>
+          </a:ln>
+          <a:effectLst>
+            <a:outerShdw sx="100000" sy="100000" kx="0" ky="0" algn="bl" rotWithShape="0" blurRad="304800" dist="101600" dir="8100000">
+              <a:srgbClr val="000000">
+                <a:alpha val="25000"/>
+              </a:srgbClr>
+            </a:outerShdw>
+          </a:effectLst>
+        </p:spPr>
+      </p:sp>
+      <p:sp>
+        <p:nvSpPr>
+          <p:cNvPr id="9" name="Text 7"/>
+          <p:cNvSpPr/>
+          <p:nvPr/>
+        </p:nvSpPr>
+        <p:spPr>
+          <a:xfrm>
+            <a:off x="4572000" y="2148840"/>
+            <a:ext cx="914400" cy="457200"/>
+          </a:xfrm>
+          <a:prstGeom prst="rect">
+            <a:avLst/>
+          </a:prstGeom>
+          <a:noFill/>
+          <a:ln/>
+        </p:spPr>
+        <p:txBody>
+          <a:bodyPr wrap="square" rtlCol="0" anchor="ctr"/>
+          <a:lstStyle/>
+          <a:p>
+            <a:pPr indent="0" marL="0">
+              <a:buNone/>
+            </a:pPr>
+            <a:r>
+              <a:rPr lang="en-US" sz="2800" b="1" dirty="0">
+                <a:solidFill>
+                  <a:srgbClr val="FF7932"/>
+                </a:solidFill>
+                <a:latin typeface="Arial Black" pitchFamily="34" charset="0"/>
+                <a:ea typeface="Arial Black" pitchFamily="34" charset="-122"/>
+                <a:cs typeface="Arial Black" pitchFamily="34" charset="-120"/>
+              </a:rPr>
+              <a:t>02</a:t>
+            </a:r>
+            <a:endParaRPr lang="en-US" sz="2800" dirty="0"/>
+          </a:p>
+        </p:txBody>
+      </p:sp>
+      <p:sp>
+        <p:nvSpPr>
+          <p:cNvPr id="10" name="Text 8"/>
+          <p:cNvSpPr/>
+          <p:nvPr/>
+        </p:nvSpPr>
+        <p:spPr>
+          <a:xfrm>
+            <a:off x="4572000" y="2651760"/>
+            <a:ext cx="2926080" cy="731520"/>
+          </a:xfrm>
+          <a:prstGeom prst="rect">
+            <a:avLst/>
+          </a:prstGeom>
+          <a:noFill/>
+          <a:ln/>
+        </p:spPr>
+        <p:txBody>
+          <a:bodyPr wrap="square" rtlCol="0" anchor="ctr"/>
+          <a:lstStyle/>
+          <a:p>
+            <a:pPr indent="0" marL="0">
+              <a:buNone/>
+            </a:pPr>
+            <a:r>
+              <a:rPr lang="en-US" sz="1800" b="1" dirty="0">
+                <a:solidFill>
+                  <a:srgbClr val="FFFFFF"/>
+                </a:solidFill>
+                <a:latin typeface="Arial" pitchFamily="34" charset="0"/>
+                <a:ea typeface="Arial" pitchFamily="34" charset="-122"/>
+                <a:cs typeface="Arial" pitchFamily="34" charset="-120"/>
+              </a:rPr>
+              <a:t>Driver App</a:t>
+            </a:r>
+            <a:endParaRPr lang="en-US" sz="1800" dirty="0"/>
+          </a:p>
+        </p:txBody>
+      </p:sp>
+      <p:sp>
+        <p:nvSpPr>
+          <p:cNvPr id="11" name="Text 9"/>
+          <p:cNvSpPr/>
+          <p:nvPr/>
+        </p:nvSpPr>
+        <p:spPr>
+          <a:xfrm>
+            <a:off x="4572000" y="3200400"/>
+            <a:ext cx="2926080" cy="365760"/>
+          </a:xfrm>
+          <a:prstGeom prst="rect">
+            <a:avLst/>
+          </a:prstGeom>
+          <a:noFill/>
+          <a:ln/>
+        </p:spPr>
+        <p:txBody>
+          <a:bodyPr wrap="square" rtlCol="0" anchor="ctr"/>
+          <a:lstStyle/>
+          <a:p>
+            <a:pPr indent="0" marL="0">
+              <a:buNone/>
+            </a:pPr>
+            <a:r>
+              <a:rPr lang="en-US" sz="1100" dirty="0">
+                <a:solidFill>
+                  <a:srgbClr val="999999"/>
+                </a:solidFill>
+                <a:latin typeface="Arial" pitchFamily="34" charset="0"/>
+                <a:ea typeface="Arial" pitchFamily="34" charset="-122"/>
+                <a:cs typeface="Arial" pitchFamily="34" charset="-120"/>
+              </a:rPr>
+              <a:t>Intuitive Bedienung</a:t>
+            </a:r>
+            <a:endParaRPr lang="en-US" sz="1100" dirty="0"/>
+          </a:p>
+        </p:txBody>
+      </p:sp>
+      <p:sp>
+        <p:nvSpPr>
+          <p:cNvPr id="12" name="Shape 10"/>
+          <p:cNvSpPr/>
+          <p:nvPr/>
+        </p:nvSpPr>
+        <p:spPr>
+          <a:xfrm>
+            <a:off x="8046720" y="2011680"/>
+            <a:ext cx="3291840" cy="1645920"/>
+          </a:xfrm>
+          <a:prstGeom prst="roundRect">
+            <a:avLst>
+              <a:gd name="adj" fmla="val 6667"/>
+            </a:avLst>
+          </a:prstGeom>
+          <a:solidFill>
+            <a:srgbClr val="1A1A1A">
+              <a:alpha val="60000"/>
+            </a:srgbClr>
+          </a:solidFill>
+          <a:ln w="12700">
+            <a:solidFill>
+              <a:srgbClr val="FF7932"/>
+            </a:solidFill>
+            <a:prstDash val="solid"/>
+          </a:ln>
+          <a:effectLst>
+            <a:outerShdw sx="100000" sy="100000" kx="0" ky="0" algn="bl" rotWithShape="0" blurRad="304800" dist="101600" dir="8100000">
+              <a:srgbClr val="000000">
+                <a:alpha val="25000"/>
+              </a:srgbClr>
+            </a:outerShdw>
+          </a:effectLst>
+        </p:spPr>
+      </p:sp>
+      <p:sp>
+        <p:nvSpPr>
+          <p:cNvPr id="13" name="Text 11"/>
+          <p:cNvSpPr/>
+          <p:nvPr/>
+        </p:nvSpPr>
+        <p:spPr>
+          <a:xfrm>
+            <a:off x="8229600" y="2148840"/>
+            <a:ext cx="914400" cy="457200"/>
+          </a:xfrm>
+          <a:prstGeom prst="rect">
+            <a:avLst/>
+          </a:prstGeom>
+          <a:noFill/>
+          <a:ln/>
+        </p:spPr>
+        <p:txBody>
+          <a:bodyPr wrap="square" rtlCol="0" anchor="ctr"/>
+          <a:lstStyle/>
+          <a:p>
+            <a:pPr indent="0" marL="0">
+              <a:buNone/>
+            </a:pPr>
+            <a:r>
+              <a:rPr lang="en-US" sz="2800" b="1" dirty="0">
+                <a:solidFill>
+                  <a:srgbClr val="FF7932"/>
+                </a:solidFill>
+                <a:latin typeface="Arial Black" pitchFamily="34" charset="0"/>
+                <a:ea typeface="Arial Black" pitchFamily="34" charset="-122"/>
+                <a:cs typeface="Arial Black" pitchFamily="34" charset="-120"/>
+              </a:rPr>
+              <a:t>03</a:t>
+            </a:r>
+            <a:endParaRPr lang="en-US" sz="2800" dirty="0"/>
+          </a:p>
+        </p:txBody>
+      </p:sp>
+      <p:sp>
+        <p:nvSpPr>
+          <p:cNvPr id="14" name="Text 12"/>
+          <p:cNvSpPr/>
+          <p:nvPr/>
+        </p:nvSpPr>
+        <p:spPr>
+          <a:xfrm>
+            <a:off x="8229600" y="2651760"/>
+            <a:ext cx="2926080" cy="731520"/>
+          </a:xfrm>
+          <a:prstGeom prst="rect">
+            <a:avLst/>
+          </a:prstGeom>
+          <a:noFill/>
+          <a:ln/>
+        </p:spPr>
+        <p:txBody>
+          <a:bodyPr wrap="square" rtlCol="0" anchor="ctr"/>
+          <a:lstStyle/>
+          <a:p>
+            <a:pPr indent="0" marL="0">
+              <a:buNone/>
+            </a:pPr>
+            <a:r>
+              <a:rPr lang="en-US" sz="1800" b="1" dirty="0">
+                <a:solidFill>
+                  <a:srgbClr val="FFFFFF"/>
+                </a:solidFill>
+                <a:latin typeface="Arial" pitchFamily="34" charset="0"/>
+                <a:ea typeface="Arial" pitchFamily="34" charset="-122"/>
+                <a:cs typeface="Arial" pitchFamily="34" charset="-120"/>
+              </a:rPr>
+              <a:t>Web-Backoffice</a:t>
+            </a:r>
+            <a:endParaRPr lang="en-US" sz="1800" dirty="0"/>
+          </a:p>
+        </p:txBody>
+      </p:sp>
+      <p:sp>
+        <p:nvSpPr>
+          <p:cNvPr id="15" name="Text 13"/>
+          <p:cNvSpPr/>
+          <p:nvPr/>
+        </p:nvSpPr>
+        <p:spPr>
+          <a:xfrm>
+            <a:off x="8229600" y="3200400"/>
+            <a:ext cx="2926080" cy="365760"/>
+          </a:xfrm>
+          <a:prstGeom prst="rect">
+            <a:avLst/>
+          </a:prstGeom>
+          <a:noFill/>
+          <a:ln/>
+        </p:spPr>
+        <p:txBody>
+          <a:bodyPr wrap="square" rtlCol="0" anchor="ctr"/>
+          <a:lstStyle/>
+          <a:p>
+            <a:pPr indent="0" marL="0">
+              <a:buNone/>
+            </a:pPr>
+            <a:r>
+              <a:rPr lang="en-US" sz="1100" dirty="0">
+                <a:solidFill>
+                  <a:srgbClr val="999999"/>
+                </a:solidFill>
+                <a:latin typeface="Arial" pitchFamily="34" charset="0"/>
+                <a:ea typeface="Arial" pitchFamily="34" charset="-122"/>
+                <a:cs typeface="Arial" pitchFamily="34" charset="-120"/>
+              </a:rPr>
+              <a:t>Moderne Oberfläche</a:t>
+            </a:r>
+            <a:endParaRPr lang="en-US" sz="1100" dirty="0"/>
+          </a:p>
+        </p:txBody>
+      </p:sp>
+      <p:sp>
+        <p:nvSpPr>
+          <p:cNvPr id="16" name="Shape 14"/>
+          <p:cNvSpPr/>
+          <p:nvPr/>
+        </p:nvSpPr>
+        <p:spPr>
+          <a:xfrm>
+            <a:off x="731520" y="4023360"/>
+            <a:ext cx="3291840" cy="1645920"/>
+          </a:xfrm>
+          <a:prstGeom prst="roundRect">
+            <a:avLst>
+              <a:gd name="adj" fmla="val 6667"/>
+            </a:avLst>
+          </a:prstGeom>
+          <a:solidFill>
+            <a:srgbClr val="1A1A1A">
+              <a:alpha val="60000"/>
+            </a:srgbClr>
+          </a:solidFill>
+          <a:ln w="12700">
+            <a:solidFill>
+              <a:srgbClr val="FF7932"/>
+            </a:solidFill>
+            <a:prstDash val="solid"/>
+          </a:ln>
+          <a:effectLst>
+            <a:outerShdw sx="100000" sy="100000" kx="0" ky="0" algn="bl" rotWithShape="0" blurRad="304800" dist="101600" dir="8100000">
+              <a:srgbClr val="000000">
+                <a:alpha val="25000"/>
+              </a:srgbClr>
+            </a:outerShdw>
+          </a:effectLst>
+        </p:spPr>
+      </p:sp>
+      <p:sp>
+        <p:nvSpPr>
+          <p:cNvPr id="17" name="Text 15"/>
+          <p:cNvSpPr/>
+          <p:nvPr/>
+        </p:nvSpPr>
+        <p:spPr>
+          <a:xfrm>
+            <a:off x="914400" y="4160520"/>
+            <a:ext cx="914400" cy="457200"/>
+          </a:xfrm>
+          <a:prstGeom prst="rect">
+            <a:avLst/>
+          </a:prstGeom>
+          <a:noFill/>
+          <a:ln/>
+        </p:spPr>
+        <p:txBody>
+          <a:bodyPr wrap="square" rtlCol="0" anchor="ctr"/>
+          <a:lstStyle/>
+          <a:p>
+            <a:pPr indent="0" marL="0">
+              <a:buNone/>
+            </a:pPr>
+            <a:r>
+              <a:rPr lang="en-US" sz="2800" b="1" dirty="0">
+                <a:solidFill>
+                  <a:srgbClr val="FF7932"/>
+                </a:solidFill>
+                <a:latin typeface="Arial Black" pitchFamily="34" charset="0"/>
+                <a:ea typeface="Arial Black" pitchFamily="34" charset="-122"/>
+                <a:cs typeface="Arial Black" pitchFamily="34" charset="-120"/>
+              </a:rPr>
+              <a:t>04</a:t>
+            </a:r>
+            <a:endParaRPr lang="en-US" sz="2800" dirty="0"/>
+          </a:p>
+        </p:txBody>
+      </p:sp>
+      <p:sp>
+        <p:nvSpPr>
+          <p:cNvPr id="18" name="Text 16"/>
+          <p:cNvSpPr/>
+          <p:nvPr/>
+        </p:nvSpPr>
+        <p:spPr>
+          <a:xfrm>
+            <a:off x="914400" y="4663440"/>
+            <a:ext cx="2926080" cy="731520"/>
+          </a:xfrm>
+          <a:prstGeom prst="rect">
+            <a:avLst/>
+          </a:prstGeom>
+          <a:noFill/>
+          <a:ln/>
+        </p:spPr>
+        <p:txBody>
+          <a:bodyPr wrap="square" rtlCol="0" anchor="ctr"/>
+          <a:lstStyle/>
+          <a:p>
+            <a:pPr indent="0" marL="0">
+              <a:buNone/>
+            </a:pPr>
+            <a:r>
+              <a:rPr lang="en-US" sz="1800" b="1" dirty="0">
+                <a:solidFill>
+                  <a:srgbClr val="FFFFFF"/>
+                </a:solidFill>
+                <a:latin typeface="Arial" pitchFamily="34" charset="0"/>
+                <a:ea typeface="Arial" pitchFamily="34" charset="-122"/>
+                <a:cs typeface="Arial" pitchFamily="34" charset="-120"/>
+              </a:rPr>
+              <a:t>Externe Dienstleister</a:t>
+            </a:r>
+            <a:endParaRPr lang="en-US" sz="1800" dirty="0"/>
+          </a:p>
+        </p:txBody>
+      </p:sp>
+      <p:sp>
+        <p:nvSpPr>
+          <p:cNvPr id="19" name="Text 17"/>
+          <p:cNvSpPr/>
+          <p:nvPr/>
+        </p:nvSpPr>
+        <p:spPr>
+          <a:xfrm>
+            <a:off x="914400" y="5212080"/>
+            <a:ext cx="2926080" cy="365760"/>
+          </a:xfrm>
+          <a:prstGeom prst="rect">
+            <a:avLst/>
+          </a:prstGeom>
+          <a:noFill/>
+          <a:ln/>
+        </p:spPr>
+        <p:txBody>
+          <a:bodyPr wrap="square" rtlCol="0" anchor="ctr"/>
+          <a:lstStyle/>
+          <a:p>
+            <a:pPr indent="0" marL="0">
+              <a:buNone/>
+            </a:pPr>
+            <a:r>
+              <a:rPr lang="en-US" sz="1100" dirty="0">
+                <a:solidFill>
+                  <a:srgbClr val="999999"/>
+                </a:solidFill>
+                <a:latin typeface="Arial" pitchFamily="34" charset="0"/>
+                <a:ea typeface="Arial" pitchFamily="34" charset="-122"/>
+                <a:cs typeface="Arial" pitchFamily="34" charset="-120"/>
+              </a:rPr>
+              <a:t>Nahtlose Integration</a:t>
+            </a:r>
+            <a:endParaRPr lang="en-US" sz="1100" dirty="0"/>
+          </a:p>
+        </p:txBody>
+      </p:sp>
+      <p:sp>
+        <p:nvSpPr>
+          <p:cNvPr id="20" name="Shape 18"/>
+          <p:cNvSpPr/>
+          <p:nvPr/>
+        </p:nvSpPr>
+        <p:spPr>
+          <a:xfrm>
+            <a:off x="4389120" y="4023360"/>
+            <a:ext cx="3291840" cy="1645920"/>
+          </a:xfrm>
+          <a:prstGeom prst="roundRect">
+            <a:avLst>
+              <a:gd name="adj" fmla="val 6667"/>
+            </a:avLst>
+          </a:prstGeom>
+          <a:solidFill>
+            <a:srgbClr val="1A1A1A">
+              <a:alpha val="60000"/>
+            </a:srgbClr>
+          </a:solidFill>
+          <a:ln w="12700">
+            <a:solidFill>
+              <a:srgbClr val="FF7932"/>
+            </a:solidFill>
+            <a:prstDash val="solid"/>
+          </a:ln>
+          <a:effectLst>
+            <a:outerShdw sx="100000" sy="100000" kx="0" ky="0" algn="bl" rotWithShape="0" blurRad="304800" dist="101600" dir="8100000">
+              <a:srgbClr val="000000">
+                <a:alpha val="25000"/>
+              </a:srgbClr>
+            </a:outerShdw>
+          </a:effectLst>
+        </p:spPr>
+      </p:sp>
+      <p:sp>
+        <p:nvSpPr>
+          <p:cNvPr id="21" name="Text 19"/>
+          <p:cNvSpPr/>
+          <p:nvPr/>
+        </p:nvSpPr>
+        <p:spPr>
+          <a:xfrm>
+            <a:off x="4572000" y="4160520"/>
+            <a:ext cx="914400" cy="457200"/>
+          </a:xfrm>
+          <a:prstGeom prst="rect">
+            <a:avLst/>
+          </a:prstGeom>
+          <a:noFill/>
+          <a:ln/>
+        </p:spPr>
+        <p:txBody>
+          <a:bodyPr wrap="square" rtlCol="0" anchor="ctr"/>
+          <a:lstStyle/>
+          <a:p>
+            <a:pPr indent="0" marL="0">
+              <a:buNone/>
+            </a:pPr>
+            <a:r>
+              <a:rPr lang="en-US" sz="2800" b="1" dirty="0">
+                <a:solidFill>
+                  <a:srgbClr val="FF7932"/>
+                </a:solidFill>
+                <a:latin typeface="Arial Black" pitchFamily="34" charset="0"/>
+                <a:ea typeface="Arial Black" pitchFamily="34" charset="-122"/>
+                <a:cs typeface="Arial Black" pitchFamily="34" charset="-120"/>
+              </a:rPr>
+              <a:t>05</a:t>
+            </a:r>
+            <a:endParaRPr lang="en-US" sz="2800" dirty="0"/>
+          </a:p>
+        </p:txBody>
+      </p:sp>
+      <p:sp>
+        <p:nvSpPr>
+          <p:cNvPr id="22" name="Text 20"/>
+          <p:cNvSpPr/>
+          <p:nvPr/>
+        </p:nvSpPr>
+        <p:spPr>
+          <a:xfrm>
+            <a:off x="4572000" y="4663440"/>
+            <a:ext cx="2926080" cy="731520"/>
+          </a:xfrm>
+          <a:prstGeom prst="rect">
+            <a:avLst/>
+          </a:prstGeom>
+          <a:noFill/>
+          <a:ln/>
+        </p:spPr>
+        <p:txBody>
+          <a:bodyPr wrap="square" rtlCol="0" anchor="ctr"/>
+          <a:lstStyle/>
+          <a:p>
+            <a:pPr indent="0" marL="0">
+              <a:buNone/>
+            </a:pPr>
+            <a:r>
+              <a:rPr lang="en-US" sz="1800" b="1" dirty="0">
+                <a:solidFill>
+                  <a:srgbClr val="FFFFFF"/>
+                </a:solidFill>
+                <a:latin typeface="Arial" pitchFamily="34" charset="0"/>
+                <a:ea typeface="Arial" pitchFamily="34" charset="-122"/>
+                <a:cs typeface="Arial" pitchFamily="34" charset="-120"/>
+              </a:rPr>
+              <a:t>Monitoring</a:t>
+            </a:r>
+            <a:endParaRPr lang="en-US" sz="1800" dirty="0"/>
+          </a:p>
+        </p:txBody>
+      </p:sp>
+      <p:sp>
+        <p:nvSpPr>
+          <p:cNvPr id="23" name="Text 21"/>
+          <p:cNvSpPr/>
+          <p:nvPr/>
+        </p:nvSpPr>
+        <p:spPr>
+          <a:xfrm>
+            <a:off x="4572000" y="5212080"/>
+            <a:ext cx="2926080" cy="365760"/>
+          </a:xfrm>
+          <a:prstGeom prst="rect">
+            <a:avLst/>
+          </a:prstGeom>
+          <a:noFill/>
+          <a:ln/>
+        </p:spPr>
+        <p:txBody>
+          <a:bodyPr wrap="square" rtlCol="0" anchor="ctr"/>
+          <a:lstStyle/>
+          <a:p>
+            <a:pPr indent="0" marL="0">
+              <a:buNone/>
+            </a:pPr>
+            <a:r>
+              <a:rPr lang="en-US" sz="1100" dirty="0">
+                <a:solidFill>
+                  <a:srgbClr val="999999"/>
+                </a:solidFill>
+                <a:latin typeface="Arial" pitchFamily="34" charset="0"/>
+                <a:ea typeface="Arial" pitchFamily="34" charset="-122"/>
+                <a:cs typeface="Arial" pitchFamily="34" charset="-120"/>
+              </a:rPr>
+              <a:t>Echtzeit-Übersicht</a:t>
+            </a:r>
+            <a:endParaRPr lang="en-US" sz="1100" dirty="0"/>
+          </a:p>
+        </p:txBody>
+      </p:sp>
+      <p:sp>
+        <p:nvSpPr>
+          <p:cNvPr id="24" name="Shape 22"/>
+          <p:cNvSpPr/>
+          <p:nvPr/>
+        </p:nvSpPr>
+        <p:spPr>
+          <a:xfrm>
+            <a:off x="8046720" y="4023360"/>
+            <a:ext cx="3291840" cy="1645920"/>
+          </a:xfrm>
+          <a:prstGeom prst="roundRect">
+            <a:avLst>
+              <a:gd name="adj" fmla="val 6667"/>
+            </a:avLst>
+          </a:prstGeom>
+          <a:solidFill>
+            <a:srgbClr val="1A1A1A">
+              <a:alpha val="60000"/>
+            </a:srgbClr>
+          </a:solidFill>
+          <a:ln w="12700">
+            <a:solidFill>
+              <a:srgbClr val="FF7932"/>
+            </a:solidFill>
+            <a:prstDash val="solid"/>
+          </a:ln>
+          <a:effectLst>
+            <a:outerShdw sx="100000" sy="100000" kx="0" ky="0" algn="bl" rotWithShape="0" blurRad="304800" dist="101600" dir="8100000">
+              <a:srgbClr val="000000">
+                <a:alpha val="25000"/>
+              </a:srgbClr>
+            </a:outerShdw>
+          </a:effectLst>
+        </p:spPr>
+      </p:sp>
+      <p:sp>
+        <p:nvSpPr>
+          <p:cNvPr id="25" name="Text 23"/>
+          <p:cNvSpPr/>
+          <p:nvPr/>
+        </p:nvSpPr>
+        <p:spPr>
+          <a:xfrm>
+            <a:off x="8229600" y="4160520"/>
+            <a:ext cx="914400" cy="457200"/>
+          </a:xfrm>
+          <a:prstGeom prst="rect">
+            <a:avLst/>
+          </a:prstGeom>
+          <a:noFill/>
+          <a:ln/>
+        </p:spPr>
+        <p:txBody>
+          <a:bodyPr wrap="square" rtlCol="0" anchor="ctr"/>
+          <a:lstStyle/>
+          <a:p>
+            <a:pPr indent="0" marL="0">
+              <a:buNone/>
+            </a:pPr>
+            <a:r>
+              <a:rPr lang="en-US" sz="2800" b="1" dirty="0">
+                <a:solidFill>
+                  <a:srgbClr val="FF7932"/>
+                </a:solidFill>
+                <a:latin typeface="Arial Black" pitchFamily="34" charset="0"/>
+                <a:ea typeface="Arial Black" pitchFamily="34" charset="-122"/>
+                <a:cs typeface="Arial Black" pitchFamily="34" charset="-120"/>
+              </a:rPr>
+              <a:t>06</a:t>
+            </a:r>
+            <a:endParaRPr lang="en-US" sz="2800" dirty="0"/>
+          </a:p>
+        </p:txBody>
+      </p:sp>
+      <p:sp>
+        <p:nvSpPr>
+          <p:cNvPr id="26" name="Text 24"/>
+          <p:cNvSpPr/>
+          <p:nvPr/>
+        </p:nvSpPr>
+        <p:spPr>
+          <a:xfrm>
+            <a:off x="8229600" y="4663440"/>
+            <a:ext cx="2926080" cy="731520"/>
+          </a:xfrm>
+          <a:prstGeom prst="rect">
+            <a:avLst/>
+          </a:prstGeom>
+          <a:noFill/>
+          <a:ln/>
+        </p:spPr>
+        <p:txBody>
+          <a:bodyPr wrap="square" rtlCol="0" anchor="ctr"/>
+          <a:lstStyle/>
+          <a:p>
+            <a:pPr indent="0" marL="0">
+              <a:buNone/>
+            </a:pPr>
+            <a:r>
+              <a:rPr lang="en-US" sz="1800" b="1" dirty="0">
+                <a:solidFill>
+                  <a:srgbClr val="FFFFFF"/>
+                </a:solidFill>
+                <a:latin typeface="Arial" pitchFamily="34" charset="0"/>
+                <a:ea typeface="Arial" pitchFamily="34" charset="-122"/>
+                <a:cs typeface="Arial" pitchFamily="34" charset="-120"/>
+              </a:rPr>
+              <a:t>Reporting</a:t>
+            </a:r>
+            <a:endParaRPr lang="en-US" sz="1800" dirty="0"/>
+          </a:p>
+        </p:txBody>
+      </p:sp>
+      <p:sp>
+        <p:nvSpPr>
+          <p:cNvPr id="27" name="Text 25"/>
+          <p:cNvSpPr/>
+          <p:nvPr/>
+        </p:nvSpPr>
+        <p:spPr>
+          <a:xfrm>
+            <a:off x="8229600" y="5212080"/>
+            <a:ext cx="2926080" cy="365760"/>
+          </a:xfrm>
+          <a:prstGeom prst="rect">
+            <a:avLst/>
+          </a:prstGeom>
+          <a:noFill/>
+          <a:ln/>
+        </p:spPr>
+        <p:txBody>
+          <a:bodyPr wrap="square" rtlCol="0" anchor="ctr"/>
+          <a:lstStyle/>
+          <a:p>
+            <a:pPr indent="0" marL="0">
+              <a:buNone/>
+            </a:pPr>
+            <a:r>
+              <a:rPr lang="en-US" sz="1100" dirty="0">
+                <a:solidFill>
+                  <a:srgbClr val="999999"/>
+                </a:solidFill>
+                <a:latin typeface="Arial" pitchFamily="34" charset="0"/>
+                <a:ea typeface="Arial" pitchFamily="34" charset="-122"/>
+                <a:cs typeface="Arial" pitchFamily="34" charset="-120"/>
+              </a:rPr>
+              <a:t>Automatisierte Reports</a:t>
+            </a:r>
+            <a:endParaRPr lang="en-US" sz="1100" dirty="0"/>
+          </a:p>
+        </p:txBody>
+      </p:sp>
+    </p:spTree>
+  </p:cSld>
+  <p:clrMapOvr>
+    <a:masterClrMapping/>
+  </p:clrMapOvr>
+</p:sld>
+</file>
+
+<file path=ppt/slides/slide5.xml><?xml version="1.0" encoding="utf-8"?>
+<p:sld xmlns:a="http://schemas.openxmlformats.org/drawingml/2006/main" xmlns:r="http://schemas.openxmlformats.org/officeDocument/2006/relationships" xmlns:p="http://schemas.openxmlformats.org/presentationml/2006/main">
+  <p:cSld name="Slide 5">
+    <p:bg>
+      <p:bgPr>
+        <a:solidFill>
+          <a:srgbClr val="0D0D0D"/>
+        </a:solidFill>
+      </p:bgPr>
+    </p:bg>
+    <p:spTree>
+      <p:nvGrpSpPr>
+        <p:cNvPr id="1" name=""/>
+        <p:cNvGrpSpPr/>
+        <p:nvPr/>
+      </p:nvGrpSpPr>
+      <p:grpSpPr>
+        <a:xfrm>
+          <a:off x="0" y="0"/>
+          <a:ext cx="0" cy="0"/>
+          <a:chOff x="0" y="0"/>
+          <a:chExt cx="0" cy="0"/>
+        </a:xfrm>
+      </p:grpSpPr>
+      <p:sp>
+        <p:nvSpPr>
+          <p:cNvPr id="2" name="Shape 0"/>
+          <p:cNvSpPr/>
+          <p:nvPr/>
+        </p:nvSpPr>
+        <p:spPr>
+          <a:xfrm>
+            <a:off x="5486400" y="-1828800"/>
+            <a:ext cx="10972800" cy="12801600"/>
+          </a:xfrm>
+          <a:prstGeom prst="ellipse">
+            <a:avLst/>
+          </a:prstGeom>
+          <a:solidFill>
+            <a:srgbClr val="FF7932">
+              <a:alpha val="12000"/>
+            </a:srgbClr>
+          </a:solidFill>
+          <a:ln w="12700">
+            <a:solidFill>
+              <a:srgbClr val="333333"/>
+            </a:solidFill>
+            <a:prstDash val="solid"/>
+          </a:ln>
+        </p:spPr>
+      </p:sp>
+      <p:sp>
+        <p:nvSpPr>
+          <p:cNvPr id="3" name="Text 1"/>
+          <p:cNvSpPr/>
+          <p:nvPr/>
+        </p:nvSpPr>
+        <p:spPr>
+          <a:xfrm>
+            <a:off x="731520" y="2103120"/>
+            <a:ext cx="9144000" cy="731520"/>
+          </a:xfrm>
+          <a:prstGeom prst="rect">
+            <a:avLst/>
+          </a:prstGeom>
+          <a:noFill/>
+          <a:ln/>
+        </p:spPr>
+        <p:txBody>
+          <a:bodyPr wrap="square" rtlCol="0" anchor="ctr"/>
+          <a:lstStyle/>
+          <a:p>
+            <a:pPr indent="0" marL="0">
+              <a:buNone/>
+            </a:pPr>
+            <a:r>
+              <a:rPr lang="en-US" sz="4400" b="1" dirty="0">
+                <a:solidFill>
+                  <a:srgbClr val="FFFFFF"/>
+                </a:solidFill>
+                <a:latin typeface="Arial" pitchFamily="34" charset="0"/>
+                <a:ea typeface="Arial" pitchFamily="34" charset="-122"/>
+                <a:cs typeface="Arial" pitchFamily="34" charset="-120"/>
+              </a:rPr>
+              <a:t>Bereit für die</a:t>
+            </a:r>
+            <a:endParaRPr lang="en-US" sz="4400" dirty="0"/>
+          </a:p>
+        </p:txBody>
+      </p:sp>
+      <p:sp>
+        <p:nvSpPr>
+          <p:cNvPr id="4" name="Text 2"/>
+          <p:cNvSpPr/>
+          <p:nvPr/>
+        </p:nvSpPr>
+        <p:spPr>
+          <a:xfrm>
+            <a:off x="731520" y="2926080"/>
+            <a:ext cx="9144000" cy="1371600"/>
+          </a:xfrm>
+          <a:prstGeom prst="rect">
+            <a:avLst/>
+          </a:prstGeom>
+          <a:noFill/>
+          <a:ln/>
+        </p:spPr>
+        <p:txBody>
+          <a:bodyPr wrap="square" rtlCol="0" anchor="ctr"/>
+          <a:lstStyle/>
+          <a:p>
+            <a:pPr indent="0" marL="0">
+              <a:buNone/>
+            </a:pPr>
+            <a:r>
+              <a:rPr lang="en-US" sz="9600" b="1" dirty="0">
+                <a:solidFill>
+                  <a:srgbClr val="FF7932"/>
+                </a:solidFill>
+                <a:latin typeface="Arial Black" pitchFamily="34" charset="0"/>
+                <a:ea typeface="Arial Black" pitchFamily="34" charset="-122"/>
+                <a:cs typeface="Arial Black" pitchFamily="34" charset="-120"/>
+              </a:rPr>
+              <a:t>Zukunft?</a:t>
+            </a:r>
+            <a:endParaRPr lang="en-US" sz="9600" dirty="0"/>
+          </a:p>
+        </p:txBody>
+      </p:sp>
+      <p:sp>
+        <p:nvSpPr>
+          <p:cNvPr id="5" name="Text 3"/>
+          <p:cNvSpPr/>
+          <p:nvPr/>
+        </p:nvSpPr>
+        <p:spPr>
+          <a:xfrm>
+            <a:off x="731520" y="4572000"/>
+            <a:ext cx="6400800" cy="914400"/>
+          </a:xfrm>
+          <a:prstGeom prst="rect">
+            <a:avLst/>
+          </a:prstGeom>
+          <a:noFill/>
+          <a:ln/>
+        </p:spPr>
+        <p:txBody>
+          <a:bodyPr wrap="square" rtlCol="0" anchor="ctr"/>
+          <a:lstStyle/>
+          <a:p>
+            <a:pPr indent="0" marL="0">
+              <a:lnSpc>
+                <a:spcPts val="2400"/>
+              </a:lnSpc>
+              <a:buNone/>
+            </a:pPr>
+            <a:r>
+              <a:rPr lang="en-US" sz="1800" dirty="0">
+                <a:solidFill>
+                  <a:srgbClr val="CCCCCC"/>
+                </a:solidFill>
+                <a:latin typeface="Arial" pitchFamily="34" charset="0"/>
+                <a:ea typeface="Arial" pitchFamily="34" charset="-122"/>
+                <a:cs typeface="Arial" pitchFamily="34" charset="-120"/>
+              </a:rPr>
+              <a:t>Gemeinsam gestalten wir die digitale Transformation Ihrer Fahrzeugdisposition.</a:t>
+            </a:r>
+            <a:endParaRPr lang="en-US" sz="1800" dirty="0"/>
+          </a:p>
+        </p:txBody>
+      </p:sp>
+      <p:sp>
+        <p:nvSpPr>
+          <p:cNvPr id="6" name="Shape 4"/>
+          <p:cNvSpPr/>
+          <p:nvPr/>
+        </p:nvSpPr>
+        <p:spPr>
+          <a:xfrm>
+            <a:off x="731520" y="5760720"/>
+            <a:ext cx="2286000" cy="54864"/>
+          </a:xfrm>
+          <a:prstGeom prst="rect">
+            <a:avLst/>
+          </a:prstGeom>
+          <a:solidFill>
+            <a:srgbClr val="FF7932"/>
+          </a:solidFill>
+          <a:ln w="12700">
+            <a:solidFill>
+              <a:srgbClr val="333333"/>
+            </a:solidFill>
+            <a:prstDash val="solid"/>
+          </a:ln>
+        </p:spPr>
+      </p:sp>
+    </p:spTree>
+  </p:cSld>
+  <p:clrMapOvr>
+    <a:masterClrMapping/>
+  </p:clrMapOvr>
+</p:sld>
+</file>
+
 <file path=ppt/theme/theme1.xml><?xml version="1.0" encoding="utf-8"?>
 <a:theme xmlns:a="http://schemas.openxmlformats.org/drawingml/2006/main" name="Office Theme">
   <a:themeElements>

</xml_diff>